<commit_message>
feat: added case study 2
</commit_message>
<xml_diff>
--- a/Case Study 1/Case Study 1# Dannys Dinner.pptx
+++ b/Case Study 1/Case Study 1# Dannys Dinner.pptx
@@ -4,6 +4,12 @@
   <p:sldMasterIdLst>
     <p:sldMasterId id="2147483648" r:id="rId1"/>
   </p:sldMasterIdLst>
+  <p:notesMasterIdLst>
+    <p:notesMasterId r:id="rId18"/>
+  </p:notesMasterIdLst>
+  <p:handoutMasterIdLst>
+    <p:handoutMasterId r:id="rId19"/>
+  </p:handoutMasterIdLst>
   <p:sldIdLst>
     <p:sldId id="256" r:id="rId2"/>
     <p:sldId id="257" r:id="rId3"/>
@@ -119,7 +125,606 @@
       </a:defRPr>
     </a:lvl9pPr>
   </p:defaultTextStyle>
+  <p:extLst>
+    <p:ext uri="{EFAFB233-063F-42B5-8137-9DF3F51BA10A}">
+      <p15:sldGuideLst xmlns:p15="http://schemas.microsoft.com/office/powerpoint/2012/main"/>
+    </p:ext>
+  </p:extLst>
 </p:presentation>
+</file>
+
+<file path=ppt/handoutMasters/handoutMaster1.xml><?xml version="1.0" encoding="utf-8"?>
+<p:handoutMaster xmlns:a="http://schemas.openxmlformats.org/drawingml/2006/main" xmlns:r="http://schemas.openxmlformats.org/officeDocument/2006/relationships" xmlns:p="http://schemas.openxmlformats.org/presentationml/2006/main">
+  <p:cSld>
+    <p:bg>
+      <p:bgRef idx="1001">
+        <a:schemeClr val="bg1"/>
+      </p:bgRef>
+    </p:bg>
+    <p:spTree>
+      <p:nvGrpSpPr>
+        <p:cNvPr id="1" name=""/>
+        <p:cNvGrpSpPr/>
+        <p:nvPr/>
+      </p:nvGrpSpPr>
+      <p:grpSpPr>
+        <a:xfrm>
+          <a:off x="0" y="0"/>
+          <a:ext cx="0" cy="0"/>
+          <a:chOff x="0" y="0"/>
+          <a:chExt cx="0" cy="0"/>
+        </a:xfrm>
+      </p:grpSpPr>
+      <p:sp>
+        <p:nvSpPr>
+          <p:cNvPr id="2" name="Header Placeholder 1"/>
+          <p:cNvSpPr>
+            <a:spLocks noGrp="1"/>
+          </p:cNvSpPr>
+          <p:nvPr>
+            <p:ph type="hdr" sz="quarter"/>
+          </p:nvPr>
+        </p:nvSpPr>
+        <p:spPr>
+          <a:xfrm>
+            <a:off x="0" y="0"/>
+            <a:ext cx="2971800" cy="458788"/>
+          </a:xfrm>
+          <a:prstGeom prst="rect">
+            <a:avLst/>
+          </a:prstGeom>
+        </p:spPr>
+        <p:txBody>
+          <a:bodyPr vert="horz" lIns="91440" tIns="45720" rIns="91440" bIns="45720" rtlCol="0"/>
+          <a:lstStyle>
+            <a:lvl1pPr algn="l">
+              <a:defRPr sz="1200"/>
+            </a:lvl1pPr>
+          </a:lstStyle>
+          <a:p>
+            <a:r>
+              <a:rPr lang="en-IN" smtClean="0"/>
+              <a:t>Krishnan S</a:t>
+            </a:r>
+            <a:endParaRPr lang="en-IN"/>
+          </a:p>
+        </p:txBody>
+      </p:sp>
+      <p:sp>
+        <p:nvSpPr>
+          <p:cNvPr id="3" name="Date Placeholder 2"/>
+          <p:cNvSpPr>
+            <a:spLocks noGrp="1"/>
+          </p:cNvSpPr>
+          <p:nvPr>
+            <p:ph type="dt" sz="quarter" idx="1"/>
+          </p:nvPr>
+        </p:nvSpPr>
+        <p:spPr>
+          <a:xfrm>
+            <a:off x="3884613" y="0"/>
+            <a:ext cx="2971800" cy="458788"/>
+          </a:xfrm>
+          <a:prstGeom prst="rect">
+            <a:avLst/>
+          </a:prstGeom>
+        </p:spPr>
+        <p:txBody>
+          <a:bodyPr vert="horz" lIns="91440" tIns="45720" rIns="91440" bIns="45720" rtlCol="0"/>
+          <a:lstStyle>
+            <a:lvl1pPr algn="r">
+              <a:defRPr sz="1200"/>
+            </a:lvl1pPr>
+          </a:lstStyle>
+          <a:p>
+            <a:fld id="{DC0646CC-DF5C-4355-8143-DD60C2916ED3}" type="datetime1">
+              <a:rPr lang="en-IN" smtClean="0"/>
+              <a:t>05-04-2024</a:t>
+            </a:fld>
+            <a:endParaRPr lang="en-IN"/>
+          </a:p>
+        </p:txBody>
+      </p:sp>
+      <p:sp>
+        <p:nvSpPr>
+          <p:cNvPr id="4" name="Footer Placeholder 3"/>
+          <p:cNvSpPr>
+            <a:spLocks noGrp="1"/>
+          </p:cNvSpPr>
+          <p:nvPr>
+            <p:ph type="ftr" sz="quarter" idx="2"/>
+          </p:nvPr>
+        </p:nvSpPr>
+        <p:spPr>
+          <a:xfrm>
+            <a:off x="0" y="8685213"/>
+            <a:ext cx="2971800" cy="458787"/>
+          </a:xfrm>
+          <a:prstGeom prst="rect">
+            <a:avLst/>
+          </a:prstGeom>
+        </p:spPr>
+        <p:txBody>
+          <a:bodyPr vert="horz" lIns="91440" tIns="45720" rIns="91440" bIns="45720" rtlCol="0" anchor="b"/>
+          <a:lstStyle>
+            <a:lvl1pPr algn="l">
+              <a:defRPr sz="1200"/>
+            </a:lvl1pPr>
+          </a:lstStyle>
+          <a:p>
+            <a:r>
+              <a:rPr lang="en-IN" smtClean="0"/>
+              <a:t>Krishnan S</a:t>
+            </a:r>
+            <a:endParaRPr lang="en-IN"/>
+          </a:p>
+        </p:txBody>
+      </p:sp>
+      <p:sp>
+        <p:nvSpPr>
+          <p:cNvPr id="5" name="Slide Number Placeholder 4"/>
+          <p:cNvSpPr>
+            <a:spLocks noGrp="1"/>
+          </p:cNvSpPr>
+          <p:nvPr>
+            <p:ph type="sldNum" sz="quarter" idx="3"/>
+          </p:nvPr>
+        </p:nvSpPr>
+        <p:spPr>
+          <a:xfrm>
+            <a:off x="3884613" y="8685213"/>
+            <a:ext cx="2971800" cy="458787"/>
+          </a:xfrm>
+          <a:prstGeom prst="rect">
+            <a:avLst/>
+          </a:prstGeom>
+        </p:spPr>
+        <p:txBody>
+          <a:bodyPr vert="horz" lIns="91440" tIns="45720" rIns="91440" bIns="45720" rtlCol="0" anchor="b"/>
+          <a:lstStyle>
+            <a:lvl1pPr algn="r">
+              <a:defRPr sz="1200"/>
+            </a:lvl1pPr>
+          </a:lstStyle>
+          <a:p>
+            <a:fld id="{0BD7798C-5CC3-4281-8C5E-93C546DF7DA6}" type="slidenum">
+              <a:rPr lang="en-IN" smtClean="0"/>
+              <a:t>‹#›</a:t>
+            </a:fld>
+            <a:endParaRPr lang="en-IN"/>
+          </a:p>
+        </p:txBody>
+      </p:sp>
+    </p:spTree>
+    <p:extLst>
+      <p:ext uri="{BB962C8B-B14F-4D97-AF65-F5344CB8AC3E}">
+        <p14:creationId xmlns:p14="http://schemas.microsoft.com/office/powerpoint/2010/main" val="3467374214"/>
+      </p:ext>
+    </p:extLst>
+  </p:cSld>
+  <p:clrMap bg1="lt1" tx1="dk1" bg2="lt2" tx2="dk2" accent1="accent1" accent2="accent2" accent3="accent3" accent4="accent4" accent5="accent5" accent6="accent6" hlink="hlink" folHlink="folHlink"/>
+  <p:hf sldNum="0" hdr="0" ftr="0" dt="0"/>
+</p:handoutMaster>
+</file>
+
+<file path=ppt/notesMasters/notesMaster1.xml><?xml version="1.0" encoding="utf-8"?>
+<p:notesMaster xmlns:a="http://schemas.openxmlformats.org/drawingml/2006/main" xmlns:r="http://schemas.openxmlformats.org/officeDocument/2006/relationships" xmlns:p="http://schemas.openxmlformats.org/presentationml/2006/main">
+  <p:cSld>
+    <p:bg>
+      <p:bgRef idx="1001">
+        <a:schemeClr val="bg1"/>
+      </p:bgRef>
+    </p:bg>
+    <p:spTree>
+      <p:nvGrpSpPr>
+        <p:cNvPr id="1" name=""/>
+        <p:cNvGrpSpPr/>
+        <p:nvPr/>
+      </p:nvGrpSpPr>
+      <p:grpSpPr>
+        <a:xfrm>
+          <a:off x="0" y="0"/>
+          <a:ext cx="0" cy="0"/>
+          <a:chOff x="0" y="0"/>
+          <a:chExt cx="0" cy="0"/>
+        </a:xfrm>
+      </p:grpSpPr>
+      <p:sp>
+        <p:nvSpPr>
+          <p:cNvPr id="2" name="Header Placeholder 1"/>
+          <p:cNvSpPr>
+            <a:spLocks noGrp="1"/>
+          </p:cNvSpPr>
+          <p:nvPr>
+            <p:ph type="hdr" sz="quarter"/>
+          </p:nvPr>
+        </p:nvSpPr>
+        <p:spPr>
+          <a:xfrm>
+            <a:off x="0" y="0"/>
+            <a:ext cx="2971800" cy="458788"/>
+          </a:xfrm>
+          <a:prstGeom prst="rect">
+            <a:avLst/>
+          </a:prstGeom>
+        </p:spPr>
+        <p:txBody>
+          <a:bodyPr vert="horz" lIns="91440" tIns="45720" rIns="91440" bIns="45720" rtlCol="0"/>
+          <a:lstStyle>
+            <a:lvl1pPr algn="l">
+              <a:defRPr sz="1200"/>
+            </a:lvl1pPr>
+          </a:lstStyle>
+          <a:p>
+            <a:r>
+              <a:rPr lang="en-IN" smtClean="0"/>
+              <a:t>Krishnan S</a:t>
+            </a:r>
+            <a:endParaRPr lang="en-IN"/>
+          </a:p>
+        </p:txBody>
+      </p:sp>
+      <p:sp>
+        <p:nvSpPr>
+          <p:cNvPr id="3" name="Date Placeholder 2"/>
+          <p:cNvSpPr>
+            <a:spLocks noGrp="1"/>
+          </p:cNvSpPr>
+          <p:nvPr>
+            <p:ph type="dt" idx="1"/>
+          </p:nvPr>
+        </p:nvSpPr>
+        <p:spPr>
+          <a:xfrm>
+            <a:off x="3884613" y="0"/>
+            <a:ext cx="2971800" cy="458788"/>
+          </a:xfrm>
+          <a:prstGeom prst="rect">
+            <a:avLst/>
+          </a:prstGeom>
+        </p:spPr>
+        <p:txBody>
+          <a:bodyPr vert="horz" lIns="91440" tIns="45720" rIns="91440" bIns="45720" rtlCol="0"/>
+          <a:lstStyle>
+            <a:lvl1pPr algn="r">
+              <a:defRPr sz="1200"/>
+            </a:lvl1pPr>
+          </a:lstStyle>
+          <a:p>
+            <a:fld id="{5B6B34D4-7CC7-4425-A2DC-B357AAE5733B}" type="datetime1">
+              <a:rPr lang="en-IN" smtClean="0"/>
+              <a:t>05-04-2024</a:t>
+            </a:fld>
+            <a:endParaRPr lang="en-IN"/>
+          </a:p>
+        </p:txBody>
+      </p:sp>
+      <p:sp>
+        <p:nvSpPr>
+          <p:cNvPr id="4" name="Slide Image Placeholder 3"/>
+          <p:cNvSpPr>
+            <a:spLocks noGrp="1" noRot="1" noChangeAspect="1"/>
+          </p:cNvSpPr>
+          <p:nvPr>
+            <p:ph type="sldImg" idx="2"/>
+          </p:nvPr>
+        </p:nvSpPr>
+        <p:spPr>
+          <a:xfrm>
+            <a:off x="685800" y="1143000"/>
+            <a:ext cx="5486400" cy="3086100"/>
+          </a:xfrm>
+          <a:prstGeom prst="rect">
+            <a:avLst/>
+          </a:prstGeom>
+          <a:noFill/>
+          <a:ln w="12700">
+            <a:solidFill>
+              <a:prstClr val="black"/>
+            </a:solidFill>
+          </a:ln>
+        </p:spPr>
+        <p:txBody>
+          <a:bodyPr vert="horz" lIns="91440" tIns="45720" rIns="91440" bIns="45720" rtlCol="0" anchor="ctr"/>
+          <a:lstStyle/>
+          <a:p>
+            <a:endParaRPr lang="en-IN"/>
+          </a:p>
+        </p:txBody>
+      </p:sp>
+      <p:sp>
+        <p:nvSpPr>
+          <p:cNvPr id="5" name="Notes Placeholder 4"/>
+          <p:cNvSpPr>
+            <a:spLocks noGrp="1"/>
+          </p:cNvSpPr>
+          <p:nvPr>
+            <p:ph type="body" sz="quarter" idx="3"/>
+          </p:nvPr>
+        </p:nvSpPr>
+        <p:spPr>
+          <a:xfrm>
+            <a:off x="685800" y="4400550"/>
+            <a:ext cx="5486400" cy="3600450"/>
+          </a:xfrm>
+          <a:prstGeom prst="rect">
+            <a:avLst/>
+          </a:prstGeom>
+        </p:spPr>
+        <p:txBody>
+          <a:bodyPr vert="horz" lIns="91440" tIns="45720" rIns="91440" bIns="45720" rtlCol="0"/>
+          <a:lstStyle/>
+          <a:p>
+            <a:pPr lvl="0"/>
+            <a:r>
+              <a:rPr lang="en-US" smtClean="0"/>
+              <a:t>Click to edit Master text styles</a:t>
+            </a:r>
+          </a:p>
+          <a:p>
+            <a:pPr lvl="1"/>
+            <a:r>
+              <a:rPr lang="en-US" smtClean="0"/>
+              <a:t>Second level</a:t>
+            </a:r>
+          </a:p>
+          <a:p>
+            <a:pPr lvl="2"/>
+            <a:r>
+              <a:rPr lang="en-US" smtClean="0"/>
+              <a:t>Third level</a:t>
+            </a:r>
+          </a:p>
+          <a:p>
+            <a:pPr lvl="3"/>
+            <a:r>
+              <a:rPr lang="en-US" smtClean="0"/>
+              <a:t>Fourth level</a:t>
+            </a:r>
+          </a:p>
+          <a:p>
+            <a:pPr lvl="4"/>
+            <a:r>
+              <a:rPr lang="en-US" smtClean="0"/>
+              <a:t>Fifth level</a:t>
+            </a:r>
+            <a:endParaRPr lang="en-IN"/>
+          </a:p>
+        </p:txBody>
+      </p:sp>
+      <p:sp>
+        <p:nvSpPr>
+          <p:cNvPr id="6" name="Footer Placeholder 5"/>
+          <p:cNvSpPr>
+            <a:spLocks noGrp="1"/>
+          </p:cNvSpPr>
+          <p:nvPr>
+            <p:ph type="ftr" sz="quarter" idx="4"/>
+          </p:nvPr>
+        </p:nvSpPr>
+        <p:spPr>
+          <a:xfrm>
+            <a:off x="0" y="8685213"/>
+            <a:ext cx="2971800" cy="458787"/>
+          </a:xfrm>
+          <a:prstGeom prst="rect">
+            <a:avLst/>
+          </a:prstGeom>
+        </p:spPr>
+        <p:txBody>
+          <a:bodyPr vert="horz" lIns="91440" tIns="45720" rIns="91440" bIns="45720" rtlCol="0" anchor="b"/>
+          <a:lstStyle>
+            <a:lvl1pPr algn="l">
+              <a:defRPr sz="1200"/>
+            </a:lvl1pPr>
+          </a:lstStyle>
+          <a:p>
+            <a:r>
+              <a:rPr lang="en-IN" smtClean="0"/>
+              <a:t>Krishnan S</a:t>
+            </a:r>
+            <a:endParaRPr lang="en-IN"/>
+          </a:p>
+        </p:txBody>
+      </p:sp>
+      <p:sp>
+        <p:nvSpPr>
+          <p:cNvPr id="7" name="Slide Number Placeholder 6"/>
+          <p:cNvSpPr>
+            <a:spLocks noGrp="1"/>
+          </p:cNvSpPr>
+          <p:nvPr>
+            <p:ph type="sldNum" sz="quarter" idx="5"/>
+          </p:nvPr>
+        </p:nvSpPr>
+        <p:spPr>
+          <a:xfrm>
+            <a:off x="3884613" y="8685213"/>
+            <a:ext cx="2971800" cy="458787"/>
+          </a:xfrm>
+          <a:prstGeom prst="rect">
+            <a:avLst/>
+          </a:prstGeom>
+        </p:spPr>
+        <p:txBody>
+          <a:bodyPr vert="horz" lIns="91440" tIns="45720" rIns="91440" bIns="45720" rtlCol="0" anchor="b"/>
+          <a:lstStyle>
+            <a:lvl1pPr algn="r">
+              <a:defRPr sz="1200"/>
+            </a:lvl1pPr>
+          </a:lstStyle>
+          <a:p>
+            <a:fld id="{191AA38F-DEB6-4ACE-A4F4-03BAED53BA35}" type="slidenum">
+              <a:rPr lang="en-IN" smtClean="0"/>
+              <a:t>‹#›</a:t>
+            </a:fld>
+            <a:endParaRPr lang="en-IN"/>
+          </a:p>
+        </p:txBody>
+      </p:sp>
+    </p:spTree>
+    <p:extLst>
+      <p:ext uri="{BB962C8B-B14F-4D97-AF65-F5344CB8AC3E}">
+        <p14:creationId xmlns:p14="http://schemas.microsoft.com/office/powerpoint/2010/main" val="426405260"/>
+      </p:ext>
+    </p:extLst>
+  </p:cSld>
+  <p:clrMap bg1="lt1" tx1="dk1" bg2="lt2" tx2="dk2" accent1="accent1" accent2="accent2" accent3="accent3" accent4="accent4" accent5="accent5" accent6="accent6" hlink="hlink" folHlink="folHlink"/>
+  <p:hf sldNum="0" hdr="0" ftr="0" dt="0"/>
+  <p:notesStyle>
+    <a:lvl1pPr marL="0" algn="l" defTabSz="914400" rtl="0" eaLnBrk="1" latinLnBrk="0" hangingPunct="1">
+      <a:defRPr sz="1200" kern="1200">
+        <a:solidFill>
+          <a:schemeClr val="tx1"/>
+        </a:solidFill>
+        <a:latin typeface="+mn-lt"/>
+        <a:ea typeface="+mn-ea"/>
+        <a:cs typeface="+mn-cs"/>
+      </a:defRPr>
+    </a:lvl1pPr>
+    <a:lvl2pPr marL="457200" algn="l" defTabSz="914400" rtl="0" eaLnBrk="1" latinLnBrk="0" hangingPunct="1">
+      <a:defRPr sz="1200" kern="1200">
+        <a:solidFill>
+          <a:schemeClr val="tx1"/>
+        </a:solidFill>
+        <a:latin typeface="+mn-lt"/>
+        <a:ea typeface="+mn-ea"/>
+        <a:cs typeface="+mn-cs"/>
+      </a:defRPr>
+    </a:lvl2pPr>
+    <a:lvl3pPr marL="914400" algn="l" defTabSz="914400" rtl="0" eaLnBrk="1" latinLnBrk="0" hangingPunct="1">
+      <a:defRPr sz="1200" kern="1200">
+        <a:solidFill>
+          <a:schemeClr val="tx1"/>
+        </a:solidFill>
+        <a:latin typeface="+mn-lt"/>
+        <a:ea typeface="+mn-ea"/>
+        <a:cs typeface="+mn-cs"/>
+      </a:defRPr>
+    </a:lvl3pPr>
+    <a:lvl4pPr marL="1371600" algn="l" defTabSz="914400" rtl="0" eaLnBrk="1" latinLnBrk="0" hangingPunct="1">
+      <a:defRPr sz="1200" kern="1200">
+        <a:solidFill>
+          <a:schemeClr val="tx1"/>
+        </a:solidFill>
+        <a:latin typeface="+mn-lt"/>
+        <a:ea typeface="+mn-ea"/>
+        <a:cs typeface="+mn-cs"/>
+      </a:defRPr>
+    </a:lvl4pPr>
+    <a:lvl5pPr marL="1828800" algn="l" defTabSz="914400" rtl="0" eaLnBrk="1" latinLnBrk="0" hangingPunct="1">
+      <a:defRPr sz="1200" kern="1200">
+        <a:solidFill>
+          <a:schemeClr val="tx1"/>
+        </a:solidFill>
+        <a:latin typeface="+mn-lt"/>
+        <a:ea typeface="+mn-ea"/>
+        <a:cs typeface="+mn-cs"/>
+      </a:defRPr>
+    </a:lvl5pPr>
+    <a:lvl6pPr marL="2286000" algn="l" defTabSz="914400" rtl="0" eaLnBrk="1" latinLnBrk="0" hangingPunct="1">
+      <a:defRPr sz="1200" kern="1200">
+        <a:solidFill>
+          <a:schemeClr val="tx1"/>
+        </a:solidFill>
+        <a:latin typeface="+mn-lt"/>
+        <a:ea typeface="+mn-ea"/>
+        <a:cs typeface="+mn-cs"/>
+      </a:defRPr>
+    </a:lvl6pPr>
+    <a:lvl7pPr marL="2743200" algn="l" defTabSz="914400" rtl="0" eaLnBrk="1" latinLnBrk="0" hangingPunct="1">
+      <a:defRPr sz="1200" kern="1200">
+        <a:solidFill>
+          <a:schemeClr val="tx1"/>
+        </a:solidFill>
+        <a:latin typeface="+mn-lt"/>
+        <a:ea typeface="+mn-ea"/>
+        <a:cs typeface="+mn-cs"/>
+      </a:defRPr>
+    </a:lvl7pPr>
+    <a:lvl8pPr marL="3200400" algn="l" defTabSz="914400" rtl="0" eaLnBrk="1" latinLnBrk="0" hangingPunct="1">
+      <a:defRPr sz="1200" kern="1200">
+        <a:solidFill>
+          <a:schemeClr val="tx1"/>
+        </a:solidFill>
+        <a:latin typeface="+mn-lt"/>
+        <a:ea typeface="+mn-ea"/>
+        <a:cs typeface="+mn-cs"/>
+      </a:defRPr>
+    </a:lvl8pPr>
+    <a:lvl9pPr marL="3657600" algn="l" defTabSz="914400" rtl="0" eaLnBrk="1" latinLnBrk="0" hangingPunct="1">
+      <a:defRPr sz="1200" kern="1200">
+        <a:solidFill>
+          <a:schemeClr val="tx1"/>
+        </a:solidFill>
+        <a:latin typeface="+mn-lt"/>
+        <a:ea typeface="+mn-ea"/>
+        <a:cs typeface="+mn-cs"/>
+      </a:defRPr>
+    </a:lvl9pPr>
+  </p:notesStyle>
+</p:notesMaster>
+</file>
+
+<file path=ppt/notesSlides/notesSlide1.xml><?xml version="1.0" encoding="utf-8"?>
+<p:notes xmlns:a="http://schemas.openxmlformats.org/drawingml/2006/main" xmlns:r="http://schemas.openxmlformats.org/officeDocument/2006/relationships" xmlns:p="http://schemas.openxmlformats.org/presentationml/2006/main">
+  <p:cSld>
+    <p:spTree>
+      <p:nvGrpSpPr>
+        <p:cNvPr id="1" name=""/>
+        <p:cNvGrpSpPr/>
+        <p:nvPr/>
+      </p:nvGrpSpPr>
+      <p:grpSpPr>
+        <a:xfrm>
+          <a:off x="0" y="0"/>
+          <a:ext cx="0" cy="0"/>
+          <a:chOff x="0" y="0"/>
+          <a:chExt cx="0" cy="0"/>
+        </a:xfrm>
+      </p:grpSpPr>
+      <p:sp>
+        <p:nvSpPr>
+          <p:cNvPr id="2" name="Slide Image Placeholder 1"/>
+          <p:cNvSpPr>
+            <a:spLocks noGrp="1" noRot="1" noChangeAspect="1"/>
+          </p:cNvSpPr>
+          <p:nvPr>
+            <p:ph type="sldImg"/>
+          </p:nvPr>
+        </p:nvSpPr>
+        <p:spPr/>
+      </p:sp>
+      <p:sp>
+        <p:nvSpPr>
+          <p:cNvPr id="3" name="Notes Placeholder 2"/>
+          <p:cNvSpPr>
+            <a:spLocks noGrp="1"/>
+          </p:cNvSpPr>
+          <p:nvPr>
+            <p:ph type="body" idx="1"/>
+          </p:nvPr>
+        </p:nvSpPr>
+        <p:spPr/>
+        <p:txBody>
+          <a:bodyPr/>
+          <a:lstStyle/>
+          <a:p>
+            <a:endParaRPr lang="en-IN"/>
+          </a:p>
+        </p:txBody>
+      </p:sp>
+    </p:spTree>
+    <p:extLst>
+      <p:ext uri="{BB962C8B-B14F-4D97-AF65-F5344CB8AC3E}">
+        <p14:creationId xmlns:p14="http://schemas.microsoft.com/office/powerpoint/2010/main" val="2181686467"/>
+      </p:ext>
+    </p:extLst>
+  </p:cSld>
+  <p:clrMapOvr>
+    <a:masterClrMapping/>
+  </p:clrMapOvr>
+</p:notes>
 </file>
 
 <file path=ppt/slideLayouts/slideLayout1.xml><?xml version="1.0" encoding="utf-8"?>
@@ -251,9 +856,9 @@
           <a:bodyPr/>
           <a:lstStyle/>
           <a:p>
-            <a:fld id="{30EDA585-0718-49B1-B69D-AB49C8577483}" type="datetimeFigureOut">
-              <a:rPr lang="en-IN" smtClean="0"/>
-              <a:t>03-04-2024</a:t>
+            <a:fld id="{81CD5269-398C-44C3-BDB2-D892793AA0CC}" type="datetime1">
+              <a:rPr lang="en-IN" smtClean="0"/>
+              <a:t>05-04-2024</a:t>
             </a:fld>
             <a:endParaRPr lang="en-IN"/>
           </a:p>
@@ -274,6 +879,10 @@
           <a:bodyPr/>
           <a:lstStyle/>
           <a:p>
+            <a:r>
+              <a:rPr lang="en-IN" smtClean="0"/>
+              <a:t>Krishnan S</a:t>
+            </a:r>
             <a:endParaRPr lang="en-IN"/>
           </a:p>
         </p:txBody>
@@ -421,9 +1030,9 @@
           <a:bodyPr/>
           <a:lstStyle/>
           <a:p>
-            <a:fld id="{30EDA585-0718-49B1-B69D-AB49C8577483}" type="datetimeFigureOut">
-              <a:rPr lang="en-IN" smtClean="0"/>
-              <a:t>03-04-2024</a:t>
+            <a:fld id="{D2CBA10D-6C03-451B-9776-C4978260948F}" type="datetime1">
+              <a:rPr lang="en-IN" smtClean="0"/>
+              <a:t>05-04-2024</a:t>
             </a:fld>
             <a:endParaRPr lang="en-IN"/>
           </a:p>
@@ -444,6 +1053,10 @@
           <a:bodyPr/>
           <a:lstStyle/>
           <a:p>
+            <a:r>
+              <a:rPr lang="en-IN" smtClean="0"/>
+              <a:t>Krishnan S</a:t>
+            </a:r>
             <a:endParaRPr lang="en-IN"/>
           </a:p>
         </p:txBody>
@@ -601,9 +1214,9 @@
           <a:bodyPr/>
           <a:lstStyle/>
           <a:p>
-            <a:fld id="{30EDA585-0718-49B1-B69D-AB49C8577483}" type="datetimeFigureOut">
-              <a:rPr lang="en-IN" smtClean="0"/>
-              <a:t>03-04-2024</a:t>
+            <a:fld id="{11C0FC47-445C-42A3-964C-789FB0C3864E}" type="datetime1">
+              <a:rPr lang="en-IN" smtClean="0"/>
+              <a:t>05-04-2024</a:t>
             </a:fld>
             <a:endParaRPr lang="en-IN"/>
           </a:p>
@@ -624,6 +1237,10 @@
           <a:bodyPr/>
           <a:lstStyle/>
           <a:p>
+            <a:r>
+              <a:rPr lang="en-IN" smtClean="0"/>
+              <a:t>Krishnan S</a:t>
+            </a:r>
             <a:endParaRPr lang="en-IN"/>
           </a:p>
         </p:txBody>
@@ -771,9 +1388,9 @@
           <a:bodyPr/>
           <a:lstStyle/>
           <a:p>
-            <a:fld id="{30EDA585-0718-49B1-B69D-AB49C8577483}" type="datetimeFigureOut">
-              <a:rPr lang="en-IN" smtClean="0"/>
-              <a:t>03-04-2024</a:t>
+            <a:fld id="{9C9B1C62-BFCC-48B9-BBF4-01035DE702EF}" type="datetime1">
+              <a:rPr lang="en-IN" smtClean="0"/>
+              <a:t>05-04-2024</a:t>
             </a:fld>
             <a:endParaRPr lang="en-IN"/>
           </a:p>
@@ -794,6 +1411,10 @@
           <a:bodyPr/>
           <a:lstStyle/>
           <a:p>
+            <a:r>
+              <a:rPr lang="en-IN" smtClean="0"/>
+              <a:t>Krishnan S</a:t>
+            </a:r>
             <a:endParaRPr lang="en-IN"/>
           </a:p>
         </p:txBody>
@@ -1017,9 +1638,9 @@
           <a:bodyPr/>
           <a:lstStyle/>
           <a:p>
-            <a:fld id="{30EDA585-0718-49B1-B69D-AB49C8577483}" type="datetimeFigureOut">
-              <a:rPr lang="en-IN" smtClean="0"/>
-              <a:t>03-04-2024</a:t>
+            <a:fld id="{96A86F45-DF9F-434A-A11A-C6F78E3AB987}" type="datetime1">
+              <a:rPr lang="en-IN" smtClean="0"/>
+              <a:t>05-04-2024</a:t>
             </a:fld>
             <a:endParaRPr lang="en-IN"/>
           </a:p>
@@ -1040,6 +1661,10 @@
           <a:bodyPr/>
           <a:lstStyle/>
           <a:p>
+            <a:r>
+              <a:rPr lang="en-IN" smtClean="0"/>
+              <a:t>Krishnan S</a:t>
+            </a:r>
             <a:endParaRPr lang="en-IN"/>
           </a:p>
         </p:txBody>
@@ -1249,9 +1874,9 @@
           <a:bodyPr/>
           <a:lstStyle/>
           <a:p>
-            <a:fld id="{30EDA585-0718-49B1-B69D-AB49C8577483}" type="datetimeFigureOut">
-              <a:rPr lang="en-IN" smtClean="0"/>
-              <a:t>03-04-2024</a:t>
+            <a:fld id="{563C27E7-4452-4796-8E02-1140B663549E}" type="datetime1">
+              <a:rPr lang="en-IN" smtClean="0"/>
+              <a:t>05-04-2024</a:t>
             </a:fld>
             <a:endParaRPr lang="en-IN"/>
           </a:p>
@@ -1272,6 +1897,10 @@
           <a:bodyPr/>
           <a:lstStyle/>
           <a:p>
+            <a:r>
+              <a:rPr lang="en-IN" smtClean="0"/>
+              <a:t>Krishnan S</a:t>
+            </a:r>
             <a:endParaRPr lang="en-IN"/>
           </a:p>
         </p:txBody>
@@ -1616,9 +2245,9 @@
           <a:bodyPr/>
           <a:lstStyle/>
           <a:p>
-            <a:fld id="{30EDA585-0718-49B1-B69D-AB49C8577483}" type="datetimeFigureOut">
-              <a:rPr lang="en-IN" smtClean="0"/>
-              <a:t>03-04-2024</a:t>
+            <a:fld id="{5249F0A7-FD70-4C15-B6F0-3E970A2EB79F}" type="datetime1">
+              <a:rPr lang="en-IN" smtClean="0"/>
+              <a:t>05-04-2024</a:t>
             </a:fld>
             <a:endParaRPr lang="en-IN"/>
           </a:p>
@@ -1639,6 +2268,10 @@
           <a:bodyPr/>
           <a:lstStyle/>
           <a:p>
+            <a:r>
+              <a:rPr lang="en-IN" smtClean="0"/>
+              <a:t>Krishnan S</a:t>
+            </a:r>
             <a:endParaRPr lang="en-IN"/>
           </a:p>
         </p:txBody>
@@ -1734,9 +2367,9 @@
           <a:bodyPr/>
           <a:lstStyle/>
           <a:p>
-            <a:fld id="{30EDA585-0718-49B1-B69D-AB49C8577483}" type="datetimeFigureOut">
-              <a:rPr lang="en-IN" smtClean="0"/>
-              <a:t>03-04-2024</a:t>
+            <a:fld id="{058725B3-F429-4C0B-BF43-65288765EAAB}" type="datetime1">
+              <a:rPr lang="en-IN" smtClean="0"/>
+              <a:t>05-04-2024</a:t>
             </a:fld>
             <a:endParaRPr lang="en-IN"/>
           </a:p>
@@ -1757,6 +2390,10 @@
           <a:bodyPr/>
           <a:lstStyle/>
           <a:p>
+            <a:r>
+              <a:rPr lang="en-IN" smtClean="0"/>
+              <a:t>Krishnan S</a:t>
+            </a:r>
             <a:endParaRPr lang="en-IN"/>
           </a:p>
         </p:txBody>
@@ -1829,9 +2466,9 @@
           <a:bodyPr/>
           <a:lstStyle/>
           <a:p>
-            <a:fld id="{30EDA585-0718-49B1-B69D-AB49C8577483}" type="datetimeFigureOut">
-              <a:rPr lang="en-IN" smtClean="0"/>
-              <a:t>03-04-2024</a:t>
+            <a:fld id="{A251C91D-A961-409B-8F34-8AFC50BFD393}" type="datetime1">
+              <a:rPr lang="en-IN" smtClean="0"/>
+              <a:t>05-04-2024</a:t>
             </a:fld>
             <a:endParaRPr lang="en-IN"/>
           </a:p>
@@ -1852,6 +2489,10 @@
           <a:bodyPr/>
           <a:lstStyle/>
           <a:p>
+            <a:r>
+              <a:rPr lang="en-IN" smtClean="0"/>
+              <a:t>Krishnan S</a:t>
+            </a:r>
             <a:endParaRPr lang="en-IN"/>
           </a:p>
         </p:txBody>
@@ -2106,9 +2747,9 @@
           <a:bodyPr/>
           <a:lstStyle/>
           <a:p>
-            <a:fld id="{30EDA585-0718-49B1-B69D-AB49C8577483}" type="datetimeFigureOut">
-              <a:rPr lang="en-IN" smtClean="0"/>
-              <a:t>03-04-2024</a:t>
+            <a:fld id="{178E7292-C1F6-4132-BB2D-7AA5AAF5BB89}" type="datetime1">
+              <a:rPr lang="en-IN" smtClean="0"/>
+              <a:t>05-04-2024</a:t>
             </a:fld>
             <a:endParaRPr lang="en-IN"/>
           </a:p>
@@ -2129,6 +2770,10 @@
           <a:bodyPr/>
           <a:lstStyle/>
           <a:p>
+            <a:r>
+              <a:rPr lang="en-IN" smtClean="0"/>
+              <a:t>Krishnan S</a:t>
+            </a:r>
             <a:endParaRPr lang="en-IN"/>
           </a:p>
         </p:txBody>
@@ -2359,9 +3004,9 @@
           <a:bodyPr/>
           <a:lstStyle/>
           <a:p>
-            <a:fld id="{30EDA585-0718-49B1-B69D-AB49C8577483}" type="datetimeFigureOut">
-              <a:rPr lang="en-IN" smtClean="0"/>
-              <a:t>03-04-2024</a:t>
+            <a:fld id="{DFFB8510-B60A-4459-8A5C-621C32CCEF7A}" type="datetime1">
+              <a:rPr lang="en-IN" smtClean="0"/>
+              <a:t>05-04-2024</a:t>
             </a:fld>
             <a:endParaRPr lang="en-IN"/>
           </a:p>
@@ -2382,6 +3027,10 @@
           <a:bodyPr/>
           <a:lstStyle/>
           <a:p>
+            <a:r>
+              <a:rPr lang="en-IN" smtClean="0"/>
+              <a:t>Krishnan S</a:t>
+            </a:r>
             <a:endParaRPr lang="en-IN"/>
           </a:p>
         </p:txBody>
@@ -2572,9 +3221,9 @@
             </a:lvl1pPr>
           </a:lstStyle>
           <a:p>
-            <a:fld id="{30EDA585-0718-49B1-B69D-AB49C8577483}" type="datetimeFigureOut">
-              <a:rPr lang="en-IN" smtClean="0"/>
-              <a:t>03-04-2024</a:t>
+            <a:fld id="{35BC61E6-CE95-4DF1-B525-1ABCA63952A7}" type="datetime1">
+              <a:rPr lang="en-IN" smtClean="0"/>
+              <a:t>05-04-2024</a:t>
             </a:fld>
             <a:endParaRPr lang="en-IN"/>
           </a:p>
@@ -2613,6 +3262,10 @@
             </a:lvl1pPr>
           </a:lstStyle>
           <a:p>
+            <a:r>
+              <a:rPr lang="en-IN" smtClean="0"/>
+              <a:t>Krishnan S</a:t>
+            </a:r>
             <a:endParaRPr lang="en-IN"/>
           </a:p>
         </p:txBody>
@@ -2679,6 +3332,7 @@
     <p:sldLayoutId id="2147483658" r:id="rId10"/>
     <p:sldLayoutId id="2147483659" r:id="rId11"/>
   </p:sldLayoutIdLst>
+  <p:hf hdr="0"/>
   <p:txStyles>
     <p:titleStyle>
       <a:lvl1pPr algn="l" defTabSz="914400" rtl="0" eaLnBrk="1" latinLnBrk="0" hangingPunct="1">
@@ -3004,7 +3658,13 @@
               <a:rPr lang="en-IN" dirty="0" smtClean="0"/>
             </a:br>
             <a:r>
-              <a:rPr lang="en-IN" dirty="0"/>
+              <a:rPr lang="en-IN" sz="6700" b="1" u="sng" dirty="0">
+                <a:solidFill>
+                  <a:schemeClr val="accent1">
+                    <a:lumMod val="75000"/>
+                  </a:schemeClr>
+                </a:solidFill>
+              </a:rPr>
               <a:t>8 Week SQL Challenge</a:t>
             </a:r>
             <a:r>
@@ -3034,12 +3694,81 @@
           <a:lstStyle/>
           <a:p>
             <a:r>
-              <a:rPr lang="en-US" b="1" dirty="0"/>
+              <a:rPr lang="en-US" sz="3600" b="1" dirty="0"/>
               <a:t>Case Study #1 - Danny's Diner</a:t>
             </a:r>
           </a:p>
           <a:p>
             <a:endParaRPr lang="en-IN" dirty="0"/>
+          </a:p>
+        </p:txBody>
+      </p:sp>
+      <p:sp>
+        <p:nvSpPr>
+          <p:cNvPr id="7" name="Date Placeholder 6"/>
+          <p:cNvSpPr>
+            <a:spLocks noGrp="1"/>
+          </p:cNvSpPr>
+          <p:nvPr>
+            <p:ph type="dt" sz="half" idx="10"/>
+          </p:nvPr>
+        </p:nvSpPr>
+        <p:spPr/>
+        <p:txBody>
+          <a:bodyPr/>
+          <a:lstStyle/>
+          <a:p>
+            <a:fld id="{FB976E18-56BF-4DF1-8CCB-54D6F61BFD8F}" type="datetime1">
+              <a:rPr lang="en-IN" smtClean="0"/>
+              <a:t>05-04-2024</a:t>
+            </a:fld>
+            <a:endParaRPr lang="en-IN"/>
+          </a:p>
+        </p:txBody>
+      </p:sp>
+      <p:sp>
+        <p:nvSpPr>
+          <p:cNvPr id="8" name="Footer Placeholder 7"/>
+          <p:cNvSpPr>
+            <a:spLocks noGrp="1"/>
+          </p:cNvSpPr>
+          <p:nvPr>
+            <p:ph type="ftr" sz="quarter" idx="11"/>
+          </p:nvPr>
+        </p:nvSpPr>
+        <p:spPr/>
+        <p:txBody>
+          <a:bodyPr/>
+          <a:lstStyle/>
+          <a:p>
+            <a:r>
+              <a:rPr lang="en-IN" smtClean="0"/>
+              <a:t>Krishnan S</a:t>
+            </a:r>
+            <a:endParaRPr lang="en-IN"/>
+          </a:p>
+        </p:txBody>
+      </p:sp>
+      <p:sp>
+        <p:nvSpPr>
+          <p:cNvPr id="9" name="Slide Number Placeholder 8"/>
+          <p:cNvSpPr>
+            <a:spLocks noGrp="1"/>
+          </p:cNvSpPr>
+          <p:nvPr>
+            <p:ph type="sldNum" sz="quarter" idx="12"/>
+          </p:nvPr>
+        </p:nvSpPr>
+        <p:spPr/>
+        <p:txBody>
+          <a:bodyPr/>
+          <a:lstStyle/>
+          <a:p>
+            <a:fld id="{F03C4FAA-76B1-4134-800D-7A1771833812}" type="slidenum">
+              <a:rPr lang="en-IN" smtClean="0"/>
+              <a:t>1</a:t>
+            </a:fld>
+            <a:endParaRPr lang="en-IN"/>
           </a:p>
         </p:txBody>
       </p:sp>
@@ -3089,7 +3818,7 @@
           <a:lstStyle/>
           <a:p>
             <a:r>
-              <a:rPr lang="en-US" sz="4000" b="1" dirty="0" smtClean="0"/>
+              <a:rPr lang="en-US" sz="4000" b="1" u="sng" dirty="0" smtClean="0"/>
               <a:t>ANSWER 6</a:t>
             </a:r>
             <a:r>
@@ -3103,50 +3832,20 @@
           </a:p>
         </p:txBody>
       </p:sp>
-      <p:cxnSp>
-        <p:nvCxnSpPr>
-          <p:cNvPr id="4" name="Straight Connector 3"/>
-          <p:cNvCxnSpPr/>
-          <p:nvPr/>
-        </p:nvCxnSpPr>
+      <p:sp>
+        <p:nvSpPr>
+          <p:cNvPr id="6" name="Content Placeholder 5"/>
+          <p:cNvSpPr>
+            <a:spLocks noGrp="1"/>
+          </p:cNvSpPr>
+          <p:nvPr>
+            <p:ph idx="1"/>
+          </p:nvPr>
+        </p:nvSpPr>
         <p:spPr>
           <a:xfrm>
-            <a:off x="838200" y="949529"/>
-            <a:ext cx="2662646" cy="0"/>
-          </a:xfrm>
-          <a:prstGeom prst="line">
-            <a:avLst/>
-          </a:prstGeom>
-        </p:spPr>
-        <p:style>
-          <a:lnRef idx="3">
-            <a:schemeClr val="dk1"/>
-          </a:lnRef>
-          <a:fillRef idx="0">
-            <a:schemeClr val="dk1"/>
-          </a:fillRef>
-          <a:effectRef idx="2">
-            <a:schemeClr val="dk1"/>
-          </a:effectRef>
-          <a:fontRef idx="minor">
-            <a:schemeClr val="tx1"/>
-          </a:fontRef>
-        </p:style>
-      </p:cxnSp>
-      <p:sp>
-        <p:nvSpPr>
-          <p:cNvPr id="6" name="Content Placeholder 5"/>
-          <p:cNvSpPr>
-            <a:spLocks noGrp="1"/>
-          </p:cNvSpPr>
-          <p:nvPr>
-            <p:ph idx="1"/>
-          </p:nvPr>
-        </p:nvSpPr>
-        <p:spPr>
-          <a:xfrm>
-            <a:off x="411480" y="1050857"/>
-            <a:ext cx="11388634" cy="4351338"/>
+            <a:off x="838199" y="1027906"/>
+            <a:ext cx="10515601" cy="4351338"/>
           </a:xfrm>
         </p:spPr>
         <p:txBody>
@@ -3188,14 +3887,83 @@
         </p:blipFill>
         <p:spPr>
           <a:xfrm>
-            <a:off x="2088500" y="1505732"/>
-            <a:ext cx="8015000" cy="5352268"/>
+            <a:off x="2402787" y="1423831"/>
+            <a:ext cx="7455316" cy="4978521"/>
           </a:xfrm>
           <a:prstGeom prst="rect">
             <a:avLst/>
           </a:prstGeom>
         </p:spPr>
       </p:pic>
+      <p:sp>
+        <p:nvSpPr>
+          <p:cNvPr id="9" name="Date Placeholder 8"/>
+          <p:cNvSpPr>
+            <a:spLocks noGrp="1"/>
+          </p:cNvSpPr>
+          <p:nvPr>
+            <p:ph type="dt" sz="half" idx="10"/>
+          </p:nvPr>
+        </p:nvSpPr>
+        <p:spPr/>
+        <p:txBody>
+          <a:bodyPr/>
+          <a:lstStyle/>
+          <a:p>
+            <a:fld id="{FE0DD600-6C88-4474-A5EF-59503A652642}" type="datetime1">
+              <a:rPr lang="en-IN" smtClean="0"/>
+              <a:t>05-04-2024</a:t>
+            </a:fld>
+            <a:endParaRPr lang="en-IN"/>
+          </a:p>
+        </p:txBody>
+      </p:sp>
+      <p:sp>
+        <p:nvSpPr>
+          <p:cNvPr id="10" name="Footer Placeholder 9"/>
+          <p:cNvSpPr>
+            <a:spLocks noGrp="1"/>
+          </p:cNvSpPr>
+          <p:nvPr>
+            <p:ph type="ftr" sz="quarter" idx="11"/>
+          </p:nvPr>
+        </p:nvSpPr>
+        <p:spPr/>
+        <p:txBody>
+          <a:bodyPr/>
+          <a:lstStyle/>
+          <a:p>
+            <a:r>
+              <a:rPr lang="en-IN" smtClean="0"/>
+              <a:t>Krishnan S</a:t>
+            </a:r>
+            <a:endParaRPr lang="en-IN"/>
+          </a:p>
+        </p:txBody>
+      </p:sp>
+      <p:sp>
+        <p:nvSpPr>
+          <p:cNvPr id="11" name="Slide Number Placeholder 10"/>
+          <p:cNvSpPr>
+            <a:spLocks noGrp="1"/>
+          </p:cNvSpPr>
+          <p:nvPr>
+            <p:ph type="sldNum" sz="quarter" idx="12"/>
+          </p:nvPr>
+        </p:nvSpPr>
+        <p:spPr/>
+        <p:txBody>
+          <a:bodyPr/>
+          <a:lstStyle/>
+          <a:p>
+            <a:fld id="{F03C4FAA-76B1-4134-800D-7A1771833812}" type="slidenum">
+              <a:rPr lang="en-IN" smtClean="0"/>
+              <a:t>10</a:t>
+            </a:fld>
+            <a:endParaRPr lang="en-IN"/>
+          </a:p>
+        </p:txBody>
+      </p:sp>
     </p:spTree>
     <p:extLst>
       <p:ext uri="{BB962C8B-B14F-4D97-AF65-F5344CB8AC3E}">
@@ -3242,7 +4010,7 @@
           <a:lstStyle/>
           <a:p>
             <a:r>
-              <a:rPr lang="en-US" sz="4000" b="1" dirty="0" smtClean="0"/>
+              <a:rPr lang="en-US" sz="4000" b="1" u="sng" dirty="0" smtClean="0"/>
               <a:t>ANSWER 7</a:t>
             </a:r>
             <a:r>
@@ -3256,50 +4024,20 @@
           </a:p>
         </p:txBody>
       </p:sp>
-      <p:cxnSp>
-        <p:nvCxnSpPr>
-          <p:cNvPr id="5" name="Straight Connector 4"/>
-          <p:cNvCxnSpPr/>
-          <p:nvPr/>
-        </p:nvCxnSpPr>
+      <p:sp>
+        <p:nvSpPr>
+          <p:cNvPr id="6" name="Content Placeholder 5"/>
+          <p:cNvSpPr>
+            <a:spLocks noGrp="1"/>
+          </p:cNvSpPr>
+          <p:nvPr>
+            <p:ph idx="1"/>
+          </p:nvPr>
+        </p:nvSpPr>
         <p:spPr>
           <a:xfrm>
             <a:off x="838200" y="949529"/>
-            <a:ext cx="2662646" cy="0"/>
-          </a:xfrm>
-          <a:prstGeom prst="line">
-            <a:avLst/>
-          </a:prstGeom>
-        </p:spPr>
-        <p:style>
-          <a:lnRef idx="3">
-            <a:schemeClr val="dk1"/>
-          </a:lnRef>
-          <a:fillRef idx="0">
-            <a:schemeClr val="dk1"/>
-          </a:fillRef>
-          <a:effectRef idx="2">
-            <a:schemeClr val="dk1"/>
-          </a:effectRef>
-          <a:fontRef idx="minor">
-            <a:schemeClr val="tx1"/>
-          </a:fontRef>
-        </p:style>
-      </p:cxnSp>
-      <p:sp>
-        <p:nvSpPr>
-          <p:cNvPr id="6" name="Content Placeholder 5"/>
-          <p:cNvSpPr>
-            <a:spLocks noGrp="1"/>
-          </p:cNvSpPr>
-          <p:nvPr>
-            <p:ph idx="1"/>
-          </p:nvPr>
-        </p:nvSpPr>
-        <p:spPr>
-          <a:xfrm>
-            <a:off x="333102" y="1027906"/>
-            <a:ext cx="11580224" cy="4351338"/>
+            <a:ext cx="10515600" cy="4351338"/>
           </a:xfrm>
         </p:spPr>
         <p:txBody>
@@ -3341,14 +4079,83 @@
         </p:blipFill>
         <p:spPr>
           <a:xfrm>
-            <a:off x="2280458" y="1457984"/>
-            <a:ext cx="7631083" cy="5302389"/>
+            <a:off x="2517271" y="1440567"/>
+            <a:ext cx="7211885" cy="5011113"/>
           </a:xfrm>
           <a:prstGeom prst="rect">
             <a:avLst/>
           </a:prstGeom>
         </p:spPr>
       </p:pic>
+      <p:sp>
+        <p:nvSpPr>
+          <p:cNvPr id="9" name="Date Placeholder 8"/>
+          <p:cNvSpPr>
+            <a:spLocks noGrp="1"/>
+          </p:cNvSpPr>
+          <p:nvPr>
+            <p:ph type="dt" sz="half" idx="10"/>
+          </p:nvPr>
+        </p:nvSpPr>
+        <p:spPr/>
+        <p:txBody>
+          <a:bodyPr/>
+          <a:lstStyle/>
+          <a:p>
+            <a:fld id="{8D71FD76-D9BF-4A4C-816C-E52A56132230}" type="datetime1">
+              <a:rPr lang="en-IN" smtClean="0"/>
+              <a:t>05-04-2024</a:t>
+            </a:fld>
+            <a:endParaRPr lang="en-IN"/>
+          </a:p>
+        </p:txBody>
+      </p:sp>
+      <p:sp>
+        <p:nvSpPr>
+          <p:cNvPr id="10" name="Footer Placeholder 9"/>
+          <p:cNvSpPr>
+            <a:spLocks noGrp="1"/>
+          </p:cNvSpPr>
+          <p:nvPr>
+            <p:ph type="ftr" sz="quarter" idx="11"/>
+          </p:nvPr>
+        </p:nvSpPr>
+        <p:spPr/>
+        <p:txBody>
+          <a:bodyPr/>
+          <a:lstStyle/>
+          <a:p>
+            <a:r>
+              <a:rPr lang="en-IN" smtClean="0"/>
+              <a:t>Krishnan S</a:t>
+            </a:r>
+            <a:endParaRPr lang="en-IN"/>
+          </a:p>
+        </p:txBody>
+      </p:sp>
+      <p:sp>
+        <p:nvSpPr>
+          <p:cNvPr id="11" name="Slide Number Placeholder 10"/>
+          <p:cNvSpPr>
+            <a:spLocks noGrp="1"/>
+          </p:cNvSpPr>
+          <p:nvPr>
+            <p:ph type="sldNum" sz="quarter" idx="12"/>
+          </p:nvPr>
+        </p:nvSpPr>
+        <p:spPr/>
+        <p:txBody>
+          <a:bodyPr/>
+          <a:lstStyle/>
+          <a:p>
+            <a:fld id="{F03C4FAA-76B1-4134-800D-7A1771833812}" type="slidenum">
+              <a:rPr lang="en-IN" smtClean="0"/>
+              <a:t>11</a:t>
+            </a:fld>
+            <a:endParaRPr lang="en-IN"/>
+          </a:p>
+        </p:txBody>
+      </p:sp>
     </p:spTree>
     <p:extLst>
       <p:ext uri="{BB962C8B-B14F-4D97-AF65-F5344CB8AC3E}">
@@ -3397,8 +4204,12 @@
           <a:lstStyle/>
           <a:p>
             <a:r>
+              <a:rPr lang="en-US" sz="4000" b="1" u="sng" dirty="0" smtClean="0"/>
+              <a:t>ANSWER 8</a:t>
+            </a:r>
+            <a:r>
               <a:rPr lang="en-US" sz="4000" b="1" dirty="0" smtClean="0"/>
-              <a:t>ANSWER 8</a:t>
+              <a:t/>
             </a:r>
             <a:br>
               <a:rPr lang="en-US" sz="4000" b="1" dirty="0" smtClean="0"/>
@@ -3407,50 +4218,20 @@
           </a:p>
         </p:txBody>
       </p:sp>
-      <p:cxnSp>
-        <p:nvCxnSpPr>
-          <p:cNvPr id="5" name="Straight Connector 4"/>
-          <p:cNvCxnSpPr/>
-          <p:nvPr/>
-        </p:nvCxnSpPr>
+      <p:sp>
+        <p:nvSpPr>
+          <p:cNvPr id="6" name="Content Placeholder 5"/>
+          <p:cNvSpPr>
+            <a:spLocks noGrp="1"/>
+          </p:cNvSpPr>
+          <p:nvPr>
+            <p:ph idx="1"/>
+          </p:nvPr>
+        </p:nvSpPr>
         <p:spPr>
           <a:xfrm>
-            <a:off x="838200" y="949529"/>
-            <a:ext cx="2662646" cy="0"/>
-          </a:xfrm>
-          <a:prstGeom prst="line">
-            <a:avLst/>
-          </a:prstGeom>
-        </p:spPr>
-        <p:style>
-          <a:lnRef idx="3">
-            <a:schemeClr val="dk1"/>
-          </a:lnRef>
-          <a:fillRef idx="0">
-            <a:schemeClr val="dk1"/>
-          </a:fillRef>
-          <a:effectRef idx="2">
-            <a:schemeClr val="dk1"/>
-          </a:effectRef>
-          <a:fontRef idx="minor">
-            <a:schemeClr val="tx1"/>
-          </a:fontRef>
-        </p:style>
-      </p:cxnSp>
-      <p:sp>
-        <p:nvSpPr>
-          <p:cNvPr id="6" name="Content Placeholder 5"/>
-          <p:cNvSpPr>
-            <a:spLocks noGrp="1"/>
-          </p:cNvSpPr>
-          <p:nvPr>
-            <p:ph idx="1"/>
-          </p:nvPr>
-        </p:nvSpPr>
-        <p:spPr>
-          <a:xfrm>
-            <a:off x="385353" y="1181189"/>
-            <a:ext cx="11397344" cy="5210901"/>
+            <a:off x="838200" y="1027906"/>
+            <a:ext cx="10430691" cy="1096985"/>
           </a:xfrm>
         </p:spPr>
         <p:txBody>
@@ -3495,14 +4276,83 @@
         </p:blipFill>
         <p:spPr>
           <a:xfrm>
-            <a:off x="644967" y="1922347"/>
-            <a:ext cx="10902065" cy="4899224"/>
+            <a:off x="1171266" y="1810418"/>
+            <a:ext cx="9849467" cy="4426202"/>
           </a:xfrm>
           <a:prstGeom prst="rect">
             <a:avLst/>
           </a:prstGeom>
         </p:spPr>
       </p:pic>
+      <p:sp>
+        <p:nvSpPr>
+          <p:cNvPr id="9" name="Date Placeholder 8"/>
+          <p:cNvSpPr>
+            <a:spLocks noGrp="1"/>
+          </p:cNvSpPr>
+          <p:nvPr>
+            <p:ph type="dt" sz="half" idx="10"/>
+          </p:nvPr>
+        </p:nvSpPr>
+        <p:spPr/>
+        <p:txBody>
+          <a:bodyPr/>
+          <a:lstStyle/>
+          <a:p>
+            <a:fld id="{48A5BE2F-7D47-455D-9A5C-4F1D779BD92B}" type="datetime1">
+              <a:rPr lang="en-IN" smtClean="0"/>
+              <a:t>05-04-2024</a:t>
+            </a:fld>
+            <a:endParaRPr lang="en-IN"/>
+          </a:p>
+        </p:txBody>
+      </p:sp>
+      <p:sp>
+        <p:nvSpPr>
+          <p:cNvPr id="10" name="Footer Placeholder 9"/>
+          <p:cNvSpPr>
+            <a:spLocks noGrp="1"/>
+          </p:cNvSpPr>
+          <p:nvPr>
+            <p:ph type="ftr" sz="quarter" idx="11"/>
+          </p:nvPr>
+        </p:nvSpPr>
+        <p:spPr/>
+        <p:txBody>
+          <a:bodyPr/>
+          <a:lstStyle/>
+          <a:p>
+            <a:r>
+              <a:rPr lang="en-IN" smtClean="0"/>
+              <a:t>Krishnan S</a:t>
+            </a:r>
+            <a:endParaRPr lang="en-IN"/>
+          </a:p>
+        </p:txBody>
+      </p:sp>
+      <p:sp>
+        <p:nvSpPr>
+          <p:cNvPr id="11" name="Slide Number Placeholder 10"/>
+          <p:cNvSpPr>
+            <a:spLocks noGrp="1"/>
+          </p:cNvSpPr>
+          <p:nvPr>
+            <p:ph type="sldNum" sz="quarter" idx="12"/>
+          </p:nvPr>
+        </p:nvSpPr>
+        <p:spPr/>
+        <p:txBody>
+          <a:bodyPr/>
+          <a:lstStyle/>
+          <a:p>
+            <a:fld id="{F03C4FAA-76B1-4134-800D-7A1771833812}" type="slidenum">
+              <a:rPr lang="en-IN" smtClean="0"/>
+              <a:t>12</a:t>
+            </a:fld>
+            <a:endParaRPr lang="en-IN"/>
+          </a:p>
+        </p:txBody>
+      </p:sp>
     </p:spTree>
     <p:extLst>
       <p:ext uri="{BB962C8B-B14F-4D97-AF65-F5344CB8AC3E}">
@@ -3549,17 +4399,17 @@
           <a:lstStyle/>
           <a:p>
             <a:r>
-              <a:rPr lang="en-US" sz="4000" b="1" dirty="0" smtClean="0"/>
+              <a:rPr lang="en-US" sz="4000" b="1" u="sng" dirty="0" smtClean="0"/>
               <a:t>ANSWER 9</a:t>
             </a:r>
             <a:r>
-              <a:rPr lang="en-US" dirty="0" smtClean="0"/>
+              <a:rPr lang="en-US" u="sng" dirty="0" smtClean="0"/>
               <a:t/>
             </a:r>
             <a:br>
-              <a:rPr lang="en-US" dirty="0" smtClean="0"/>
+              <a:rPr lang="en-US" u="sng" dirty="0" smtClean="0"/>
             </a:br>
-            <a:endParaRPr lang="en-IN" dirty="0"/>
+            <a:endParaRPr lang="en-IN" u="sng" dirty="0"/>
           </a:p>
         </p:txBody>
       </p:sp>
@@ -3575,8 +4425,8 @@
         </p:nvSpPr>
         <p:spPr>
           <a:xfrm>
-            <a:off x="359228" y="949529"/>
-            <a:ext cx="11467012" cy="4737168"/>
+            <a:off x="555396" y="949529"/>
+            <a:ext cx="11074675" cy="4737168"/>
           </a:xfrm>
         </p:spPr>
         <p:txBody>
@@ -3591,6 +4441,204 @@
               <a:t>9.  If each $1 spent equates to 10 points and sushi has a 2x points multiplier how many points would each customer have?</a:t>
             </a:r>
             <a:endParaRPr lang="en-IN" dirty="0"/>
+          </a:p>
+        </p:txBody>
+      </p:sp>
+      <p:pic>
+        <p:nvPicPr>
+          <p:cNvPr id="5" name="Picture 4"/>
+          <p:cNvPicPr>
+            <a:picLocks noChangeAspect="1"/>
+          </p:cNvPicPr>
+          <p:nvPr/>
+        </p:nvPicPr>
+        <p:blipFill>
+          <a:blip r:embed="rId2">
+            <a:extLst>
+              <a:ext uri="{28A0092B-C50C-407E-A947-70E740481C1C}">
+                <a14:useLocalDpi xmlns:a14="http://schemas.microsoft.com/office/drawing/2010/main" val="0"/>
+              </a:ext>
+            </a:extLst>
+          </a:blip>
+          <a:stretch>
+            <a:fillRect/>
+          </a:stretch>
+        </p:blipFill>
+        <p:spPr>
+          <a:xfrm>
+            <a:off x="937179" y="1863633"/>
+            <a:ext cx="10311108" cy="4250998"/>
+          </a:xfrm>
+          <a:prstGeom prst="rect">
+            <a:avLst/>
+          </a:prstGeom>
+        </p:spPr>
+      </p:pic>
+      <p:sp>
+        <p:nvSpPr>
+          <p:cNvPr id="9" name="Date Placeholder 8"/>
+          <p:cNvSpPr>
+            <a:spLocks noGrp="1"/>
+          </p:cNvSpPr>
+          <p:nvPr>
+            <p:ph type="dt" sz="half" idx="10"/>
+          </p:nvPr>
+        </p:nvSpPr>
+        <p:spPr/>
+        <p:txBody>
+          <a:bodyPr/>
+          <a:lstStyle/>
+          <a:p>
+            <a:fld id="{DF5ACA46-B6B5-4905-8947-0ED23BCC9D18}" type="datetime1">
+              <a:rPr lang="en-IN" smtClean="0"/>
+              <a:t>05-04-2024</a:t>
+            </a:fld>
+            <a:endParaRPr lang="en-IN"/>
+          </a:p>
+        </p:txBody>
+      </p:sp>
+      <p:sp>
+        <p:nvSpPr>
+          <p:cNvPr id="10" name="Footer Placeholder 9"/>
+          <p:cNvSpPr>
+            <a:spLocks noGrp="1"/>
+          </p:cNvSpPr>
+          <p:nvPr>
+            <p:ph type="ftr" sz="quarter" idx="11"/>
+          </p:nvPr>
+        </p:nvSpPr>
+        <p:spPr/>
+        <p:txBody>
+          <a:bodyPr/>
+          <a:lstStyle/>
+          <a:p>
+            <a:r>
+              <a:rPr lang="en-IN" smtClean="0"/>
+              <a:t>Krishnan S</a:t>
+            </a:r>
+            <a:endParaRPr lang="en-IN"/>
+          </a:p>
+        </p:txBody>
+      </p:sp>
+      <p:sp>
+        <p:nvSpPr>
+          <p:cNvPr id="11" name="Slide Number Placeholder 10"/>
+          <p:cNvSpPr>
+            <a:spLocks noGrp="1"/>
+          </p:cNvSpPr>
+          <p:nvPr>
+            <p:ph type="sldNum" sz="quarter" idx="12"/>
+          </p:nvPr>
+        </p:nvSpPr>
+        <p:spPr/>
+        <p:txBody>
+          <a:bodyPr/>
+          <a:lstStyle/>
+          <a:p>
+            <a:fld id="{F03C4FAA-76B1-4134-800D-7A1771833812}" type="slidenum">
+              <a:rPr lang="en-IN" smtClean="0"/>
+              <a:t>13</a:t>
+            </a:fld>
+            <a:endParaRPr lang="en-IN"/>
+          </a:p>
+        </p:txBody>
+      </p:sp>
+    </p:spTree>
+    <p:extLst>
+      <p:ext uri="{BB962C8B-B14F-4D97-AF65-F5344CB8AC3E}">
+        <p14:creationId xmlns:p14="http://schemas.microsoft.com/office/powerpoint/2010/main" val="3441136085"/>
+      </p:ext>
+    </p:extLst>
+  </p:cSld>
+  <p:clrMapOvr>
+    <a:masterClrMapping/>
+  </p:clrMapOvr>
+</p:sld>
+</file>
+
+<file path=ppt/slides/slide14.xml><?xml version="1.0" encoding="utf-8"?>
+<p:sld xmlns:a="http://schemas.openxmlformats.org/drawingml/2006/main" xmlns:r="http://schemas.openxmlformats.org/officeDocument/2006/relationships" xmlns:p="http://schemas.openxmlformats.org/presentationml/2006/main">
+  <p:cSld>
+    <p:spTree>
+      <p:nvGrpSpPr>
+        <p:cNvPr id="1" name=""/>
+        <p:cNvGrpSpPr/>
+        <p:nvPr/>
+      </p:nvGrpSpPr>
+      <p:grpSpPr>
+        <a:xfrm>
+          <a:off x="0" y="0"/>
+          <a:ext cx="0" cy="0"/>
+          <a:chOff x="0" y="0"/>
+          <a:chExt cx="0" cy="0"/>
+        </a:xfrm>
+      </p:grpSpPr>
+      <p:sp>
+        <p:nvSpPr>
+          <p:cNvPr id="2" name="Title 1"/>
+          <p:cNvSpPr>
+            <a:spLocks noGrp="1"/>
+          </p:cNvSpPr>
+          <p:nvPr>
+            <p:ph type="title"/>
+          </p:nvPr>
+        </p:nvSpPr>
+        <p:spPr/>
+        <p:txBody>
+          <a:bodyPr>
+            <a:normAutofit/>
+          </a:bodyPr>
+          <a:lstStyle/>
+          <a:p>
+            <a:r>
+              <a:rPr lang="en-US" sz="4000" b="1" dirty="0" smtClean="0"/>
+              <a:t>ANSWER 10</a:t>
+            </a:r>
+            <a:br>
+              <a:rPr lang="en-US" sz="4000" b="1" dirty="0" smtClean="0"/>
+            </a:br>
+            <a:endParaRPr lang="en-IN" sz="4000" b="1" dirty="0"/>
+          </a:p>
+        </p:txBody>
+      </p:sp>
+      <p:sp>
+        <p:nvSpPr>
+          <p:cNvPr id="3" name="Content Placeholder 2"/>
+          <p:cNvSpPr>
+            <a:spLocks noGrp="1"/>
+          </p:cNvSpPr>
+          <p:nvPr>
+            <p:ph idx="1"/>
+          </p:nvPr>
+        </p:nvSpPr>
+        <p:spPr>
+          <a:xfrm>
+            <a:off x="838199" y="1027906"/>
+            <a:ext cx="10515601" cy="1227614"/>
+          </a:xfrm>
+        </p:spPr>
+        <p:txBody>
+          <a:bodyPr>
+            <a:normAutofit/>
+          </a:bodyPr>
+          <a:lstStyle/>
+          <a:p>
+            <a:pPr marL="0" indent="0">
+              <a:buNone/>
+            </a:pPr>
+            <a:r>
+              <a:rPr lang="en-US" sz="2400" dirty="0" smtClean="0"/>
+              <a:t>10. In the first week after a customer joins the program (including their join date) they </a:t>
+            </a:r>
+            <a:r>
+              <a:rPr lang="en-US" sz="2400" dirty="0" smtClean="0"/>
+              <a:t>earn 2x </a:t>
+            </a:r>
+            <a:r>
+              <a:rPr lang="en-US" sz="2400" dirty="0" smtClean="0"/>
+              <a:t>points on all items, not just sushi how many points do customer A and B have at the end of January?</a:t>
+            </a:r>
+            <a:endParaRPr lang="en-IN" sz="2400" dirty="0"/>
           </a:p>
         </p:txBody>
       </p:sp>
@@ -3646,165 +4694,83 @@
         </p:blipFill>
         <p:spPr>
           <a:xfrm>
-            <a:off x="555397" y="1852421"/>
-            <a:ext cx="11074674" cy="4565796"/>
+            <a:off x="1182187" y="2024892"/>
+            <a:ext cx="9827623" cy="4331458"/>
           </a:xfrm>
           <a:prstGeom prst="rect">
             <a:avLst/>
           </a:prstGeom>
         </p:spPr>
       </p:pic>
-    </p:spTree>
-    <p:extLst>
-      <p:ext uri="{BB962C8B-B14F-4D97-AF65-F5344CB8AC3E}">
-        <p14:creationId xmlns:p14="http://schemas.microsoft.com/office/powerpoint/2010/main" val="3441136085"/>
-      </p:ext>
-    </p:extLst>
-  </p:cSld>
-  <p:clrMapOvr>
-    <a:masterClrMapping/>
-  </p:clrMapOvr>
-</p:sld>
-</file>
-
-<file path=ppt/slides/slide14.xml><?xml version="1.0" encoding="utf-8"?>
-<p:sld xmlns:a="http://schemas.openxmlformats.org/drawingml/2006/main" xmlns:r="http://schemas.openxmlformats.org/officeDocument/2006/relationships" xmlns:p="http://schemas.openxmlformats.org/presentationml/2006/main">
-  <p:cSld>
-    <p:spTree>
-      <p:nvGrpSpPr>
-        <p:cNvPr id="1" name=""/>
-        <p:cNvGrpSpPr/>
-        <p:nvPr/>
-      </p:nvGrpSpPr>
-      <p:grpSpPr>
-        <a:xfrm>
-          <a:off x="0" y="0"/>
-          <a:ext cx="0" cy="0"/>
-          <a:chOff x="0" y="0"/>
-          <a:chExt cx="0" cy="0"/>
-        </a:xfrm>
-      </p:grpSpPr>
-      <p:sp>
-        <p:nvSpPr>
-          <p:cNvPr id="2" name="Title 1"/>
-          <p:cNvSpPr>
-            <a:spLocks noGrp="1"/>
-          </p:cNvSpPr>
-          <p:nvPr>
-            <p:ph type="title"/>
-          </p:nvPr>
-        </p:nvSpPr>
-        <p:spPr/>
-        <p:txBody>
-          <a:bodyPr>
-            <a:normAutofit/>
-          </a:bodyPr>
-          <a:lstStyle/>
-          <a:p>
-            <a:r>
-              <a:rPr lang="en-US" sz="4000" b="1" dirty="0" smtClean="0"/>
-              <a:t>ANSWER 10</a:t>
-            </a:r>
-            <a:br>
-              <a:rPr lang="en-US" sz="4000" b="1" dirty="0" smtClean="0"/>
-            </a:br>
-            <a:endParaRPr lang="en-IN" sz="4000" b="1" dirty="0"/>
-          </a:p>
-        </p:txBody>
-      </p:sp>
-      <p:sp>
-        <p:nvSpPr>
-          <p:cNvPr id="3" name="Content Placeholder 2"/>
-          <p:cNvSpPr>
-            <a:spLocks noGrp="1"/>
-          </p:cNvSpPr>
-          <p:nvPr>
-            <p:ph idx="1"/>
-          </p:nvPr>
-        </p:nvSpPr>
-        <p:spPr>
-          <a:xfrm>
-            <a:off x="306976" y="949529"/>
-            <a:ext cx="11545389" cy="4351338"/>
-          </a:xfrm>
-        </p:spPr>
-        <p:txBody>
-          <a:bodyPr>
-            <a:normAutofit/>
-          </a:bodyPr>
-          <a:lstStyle/>
-          <a:p>
-            <a:pPr marL="0" indent="0">
-              <a:buNone/>
-            </a:pPr>
-            <a:r>
-              <a:rPr lang="en-US" sz="2400" dirty="0" smtClean="0"/>
-              <a:t>10. In the first week after a customer joins the program (including their join date) they earn         2x points on all items, not just sushi how many points do customer A and B have at the end of January?</a:t>
-            </a:r>
-            <a:endParaRPr lang="en-IN" sz="2400" dirty="0"/>
-          </a:p>
-        </p:txBody>
-      </p:sp>
-      <p:cxnSp>
-        <p:nvCxnSpPr>
-          <p:cNvPr id="4" name="Straight Connector 3"/>
-          <p:cNvCxnSpPr/>
-          <p:nvPr/>
-        </p:nvCxnSpPr>
-        <p:spPr>
-          <a:xfrm>
-            <a:off x="838200" y="949529"/>
-            <a:ext cx="2662646" cy="0"/>
-          </a:xfrm>
-          <a:prstGeom prst="line">
-            <a:avLst/>
-          </a:prstGeom>
-        </p:spPr>
-        <p:style>
-          <a:lnRef idx="3">
-            <a:schemeClr val="dk1"/>
-          </a:lnRef>
-          <a:fillRef idx="0">
-            <a:schemeClr val="dk1"/>
-          </a:fillRef>
-          <a:effectRef idx="2">
-            <a:schemeClr val="dk1"/>
-          </a:effectRef>
-          <a:fontRef idx="minor">
-            <a:schemeClr val="tx1"/>
-          </a:fontRef>
-        </p:style>
-      </p:cxnSp>
-      <p:pic>
-        <p:nvPicPr>
-          <p:cNvPr id="5" name="Picture 4"/>
-          <p:cNvPicPr>
-            <a:picLocks noChangeAspect="1"/>
-          </p:cNvPicPr>
-          <p:nvPr/>
-        </p:nvPicPr>
-        <p:blipFill>
-          <a:blip r:embed="rId2">
-            <a:extLst>
-              <a:ext uri="{28A0092B-C50C-407E-A947-70E740481C1C}">
-                <a14:useLocalDpi xmlns:a14="http://schemas.microsoft.com/office/drawing/2010/main" val="0"/>
-              </a:ext>
-            </a:extLst>
-          </a:blip>
-          <a:stretch>
-            <a:fillRect/>
-          </a:stretch>
-        </p:blipFill>
-        <p:spPr>
-          <a:xfrm>
-            <a:off x="452129" y="2029606"/>
-            <a:ext cx="11255081" cy="4613884"/>
-          </a:xfrm>
-          <a:prstGeom prst="rect">
-            <a:avLst/>
-          </a:prstGeom>
-        </p:spPr>
-      </p:pic>
+      <p:sp>
+        <p:nvSpPr>
+          <p:cNvPr id="9" name="Date Placeholder 8"/>
+          <p:cNvSpPr>
+            <a:spLocks noGrp="1"/>
+          </p:cNvSpPr>
+          <p:nvPr>
+            <p:ph type="dt" sz="half" idx="10"/>
+          </p:nvPr>
+        </p:nvSpPr>
+        <p:spPr/>
+        <p:txBody>
+          <a:bodyPr/>
+          <a:lstStyle/>
+          <a:p>
+            <a:fld id="{BF98597E-A61F-4FBF-A490-753EEEA145D4}" type="datetime1">
+              <a:rPr lang="en-IN" smtClean="0"/>
+              <a:t>05-04-2024</a:t>
+            </a:fld>
+            <a:endParaRPr lang="en-IN"/>
+          </a:p>
+        </p:txBody>
+      </p:sp>
+      <p:sp>
+        <p:nvSpPr>
+          <p:cNvPr id="10" name="Footer Placeholder 9"/>
+          <p:cNvSpPr>
+            <a:spLocks noGrp="1"/>
+          </p:cNvSpPr>
+          <p:nvPr>
+            <p:ph type="ftr" sz="quarter" idx="11"/>
+          </p:nvPr>
+        </p:nvSpPr>
+        <p:spPr/>
+        <p:txBody>
+          <a:bodyPr/>
+          <a:lstStyle/>
+          <a:p>
+            <a:r>
+              <a:rPr lang="en-IN" smtClean="0"/>
+              <a:t>Krishnan S</a:t>
+            </a:r>
+            <a:endParaRPr lang="en-IN"/>
+          </a:p>
+        </p:txBody>
+      </p:sp>
+      <p:sp>
+        <p:nvSpPr>
+          <p:cNvPr id="11" name="Slide Number Placeholder 10"/>
+          <p:cNvSpPr>
+            <a:spLocks noGrp="1"/>
+          </p:cNvSpPr>
+          <p:nvPr>
+            <p:ph type="sldNum" sz="quarter" idx="12"/>
+          </p:nvPr>
+        </p:nvSpPr>
+        <p:spPr/>
+        <p:txBody>
+          <a:bodyPr/>
+          <a:lstStyle/>
+          <a:p>
+            <a:fld id="{F03C4FAA-76B1-4134-800D-7A1771833812}" type="slidenum">
+              <a:rPr lang="en-IN" smtClean="0"/>
+              <a:t>14</a:t>
+            </a:fld>
+            <a:endParaRPr lang="en-IN"/>
+          </a:p>
+        </p:txBody>
+      </p:sp>
     </p:spTree>
     <p:extLst>
       <p:ext uri="{BB962C8B-B14F-4D97-AF65-F5344CB8AC3E}">
@@ -3853,8 +4819,12 @@
           <a:lstStyle/>
           <a:p>
             <a:r>
+              <a:rPr lang="en-US" sz="4000" b="1" u="sng" dirty="0" smtClean="0"/>
+              <a:t>BONUS QUESTIONS</a:t>
+            </a:r>
+            <a:r>
               <a:rPr lang="en-US" sz="4000" b="1" dirty="0" smtClean="0"/>
-              <a:t>BONUS QUESTIONS</a:t>
+              <a:t/>
             </a:r>
             <a:br>
               <a:rPr lang="en-US" sz="4000" b="1" dirty="0" smtClean="0"/>
@@ -3875,8 +4845,8 @@
         </p:nvSpPr>
         <p:spPr>
           <a:xfrm>
-            <a:off x="350519" y="1163773"/>
-            <a:ext cx="11484429" cy="4351338"/>
+            <a:off x="831669" y="1051910"/>
+            <a:ext cx="5423264" cy="526915"/>
           </a:xfrm>
         </p:spPr>
         <p:txBody>
@@ -3889,43 +4859,13 @@
               <a:buNone/>
             </a:pPr>
             <a:r>
-              <a:rPr lang="en-US" sz="2400" dirty="0" smtClean="0"/>
+              <a:rPr lang="en-US" dirty="0" smtClean="0"/>
               <a:t>Join All The Things</a:t>
             </a:r>
-            <a:endParaRPr lang="en-IN" sz="2400" dirty="0"/>
-          </a:p>
-        </p:txBody>
-      </p:sp>
-      <p:cxnSp>
-        <p:nvCxnSpPr>
-          <p:cNvPr id="4" name="Straight Connector 3"/>
-          <p:cNvCxnSpPr/>
-          <p:nvPr/>
-        </p:nvCxnSpPr>
-        <p:spPr>
-          <a:xfrm flipV="1">
-            <a:off x="838200" y="940526"/>
-            <a:ext cx="4064726" cy="9003"/>
-          </a:xfrm>
-          <a:prstGeom prst="line">
-            <a:avLst/>
-          </a:prstGeom>
-        </p:spPr>
-        <p:style>
-          <a:lnRef idx="3">
-            <a:schemeClr val="dk1"/>
-          </a:lnRef>
-          <a:fillRef idx="0">
-            <a:schemeClr val="dk1"/>
-          </a:fillRef>
-          <a:effectRef idx="2">
-            <a:schemeClr val="dk1"/>
-          </a:effectRef>
-          <a:fontRef idx="minor">
-            <a:schemeClr val="tx1"/>
-          </a:fontRef>
-        </p:style>
-      </p:cxnSp>
+            <a:endParaRPr lang="en-IN" dirty="0"/>
+          </a:p>
+        </p:txBody>
+      </p:sp>
       <p:pic>
         <p:nvPicPr>
           <p:cNvPr id="7" name="Picture 6"/>
@@ -3948,8 +4888,8 @@
         </p:blipFill>
         <p:spPr>
           <a:xfrm>
-            <a:off x="74975" y="1615912"/>
-            <a:ext cx="5698808" cy="4889391"/>
+            <a:off x="272142" y="1578825"/>
+            <a:ext cx="6973387" cy="4702364"/>
           </a:xfrm>
           <a:prstGeom prst="rect">
             <a:avLst/>
@@ -3978,14 +4918,83 @@
         </p:blipFill>
         <p:spPr>
           <a:xfrm>
-            <a:off x="5773783" y="1515290"/>
-            <a:ext cx="6418217" cy="5155475"/>
+            <a:off x="7245530" y="1578825"/>
+            <a:ext cx="4919255" cy="3694676"/>
           </a:xfrm>
           <a:prstGeom prst="rect">
             <a:avLst/>
           </a:prstGeom>
         </p:spPr>
       </p:pic>
+      <p:sp>
+        <p:nvSpPr>
+          <p:cNvPr id="10" name="Date Placeholder 9"/>
+          <p:cNvSpPr>
+            <a:spLocks noGrp="1"/>
+          </p:cNvSpPr>
+          <p:nvPr>
+            <p:ph type="dt" sz="half" idx="10"/>
+          </p:nvPr>
+        </p:nvSpPr>
+        <p:spPr/>
+        <p:txBody>
+          <a:bodyPr/>
+          <a:lstStyle/>
+          <a:p>
+            <a:fld id="{5A8E401B-6626-4C8B-9870-8EC179DE7D04}" type="datetime1">
+              <a:rPr lang="en-IN" smtClean="0"/>
+              <a:t>05-04-2024</a:t>
+            </a:fld>
+            <a:endParaRPr lang="en-IN"/>
+          </a:p>
+        </p:txBody>
+      </p:sp>
+      <p:sp>
+        <p:nvSpPr>
+          <p:cNvPr id="11" name="Footer Placeholder 10"/>
+          <p:cNvSpPr>
+            <a:spLocks noGrp="1"/>
+          </p:cNvSpPr>
+          <p:nvPr>
+            <p:ph type="ftr" sz="quarter" idx="11"/>
+          </p:nvPr>
+        </p:nvSpPr>
+        <p:spPr/>
+        <p:txBody>
+          <a:bodyPr/>
+          <a:lstStyle/>
+          <a:p>
+            <a:r>
+              <a:rPr lang="en-IN" smtClean="0"/>
+              <a:t>Krishnan S</a:t>
+            </a:r>
+            <a:endParaRPr lang="en-IN"/>
+          </a:p>
+        </p:txBody>
+      </p:sp>
+      <p:sp>
+        <p:nvSpPr>
+          <p:cNvPr id="12" name="Slide Number Placeholder 11"/>
+          <p:cNvSpPr>
+            <a:spLocks noGrp="1"/>
+          </p:cNvSpPr>
+          <p:nvPr>
+            <p:ph type="sldNum" sz="quarter" idx="12"/>
+          </p:nvPr>
+        </p:nvSpPr>
+        <p:spPr/>
+        <p:txBody>
+          <a:bodyPr/>
+          <a:lstStyle/>
+          <a:p>
+            <a:fld id="{F03C4FAA-76B1-4134-800D-7A1771833812}" type="slidenum">
+              <a:rPr lang="en-IN" smtClean="0"/>
+              <a:t>15</a:t>
+            </a:fld>
+            <a:endParaRPr lang="en-IN"/>
+          </a:p>
+        </p:txBody>
+      </p:sp>
     </p:spTree>
     <p:extLst>
       <p:ext uri="{BB962C8B-B14F-4D97-AF65-F5344CB8AC3E}">
@@ -4034,13 +5043,13 @@
           <a:lstStyle/>
           <a:p>
             <a:r>
-              <a:rPr lang="en-US" sz="4000" b="1" dirty="0" smtClean="0"/>
+              <a:rPr lang="en-US" sz="4000" b="1" u="sng" dirty="0" smtClean="0"/>
               <a:t>BONUS QUESTIONS</a:t>
             </a:r>
             <a:br>
-              <a:rPr lang="en-US" sz="4000" b="1" dirty="0" smtClean="0"/>
+              <a:rPr lang="en-US" sz="4000" b="1" u="sng" dirty="0" smtClean="0"/>
             </a:br>
-            <a:endParaRPr lang="en-IN" sz="4000" b="1" dirty="0"/>
+            <a:endParaRPr lang="en-IN" sz="4000" b="1" u="sng" dirty="0"/>
           </a:p>
         </p:txBody>
       </p:sp>
@@ -4056,8 +5065,8 @@
         </p:nvSpPr>
         <p:spPr>
           <a:xfrm>
-            <a:off x="341810" y="1128939"/>
-            <a:ext cx="11336383" cy="4351338"/>
+            <a:off x="838200" y="987331"/>
+            <a:ext cx="10578737" cy="1652237"/>
           </a:xfrm>
         </p:spPr>
         <p:txBody>
@@ -4075,36 +5084,6 @@
           </a:p>
         </p:txBody>
       </p:sp>
-      <p:cxnSp>
-        <p:nvCxnSpPr>
-          <p:cNvPr id="4" name="Straight Connector 3"/>
-          <p:cNvCxnSpPr/>
-          <p:nvPr/>
-        </p:nvCxnSpPr>
-        <p:spPr>
-          <a:xfrm flipV="1">
-            <a:off x="838200" y="940526"/>
-            <a:ext cx="4064726" cy="9003"/>
-          </a:xfrm>
-          <a:prstGeom prst="line">
-            <a:avLst/>
-          </a:prstGeom>
-        </p:spPr>
-        <p:style>
-          <a:lnRef idx="3">
-            <a:schemeClr val="dk1"/>
-          </a:lnRef>
-          <a:fillRef idx="0">
-            <a:schemeClr val="dk1"/>
-          </a:fillRef>
-          <a:effectRef idx="2">
-            <a:schemeClr val="dk1"/>
-          </a:effectRef>
-          <a:fontRef idx="minor">
-            <a:schemeClr val="tx1"/>
-          </a:fontRef>
-        </p:style>
-      </p:cxnSp>
       <p:pic>
         <p:nvPicPr>
           <p:cNvPr id="7" name="Picture 6"/>
@@ -4127,8 +5106,8 @@
         </p:blipFill>
         <p:spPr>
           <a:xfrm>
-            <a:off x="0" y="1524930"/>
-            <a:ext cx="6242022" cy="5250339"/>
+            <a:off x="140196" y="1398965"/>
+            <a:ext cx="6762666" cy="4957385"/>
           </a:xfrm>
           <a:prstGeom prst="rect">
             <a:avLst/>
@@ -4157,14 +5136,83 @@
         </p:blipFill>
         <p:spPr>
           <a:xfrm>
-            <a:off x="6242022" y="1278871"/>
-            <a:ext cx="5932561" cy="5496398"/>
+            <a:off x="6902862" y="1398965"/>
+            <a:ext cx="5158509" cy="4163382"/>
           </a:xfrm>
           <a:prstGeom prst="rect">
             <a:avLst/>
           </a:prstGeom>
         </p:spPr>
       </p:pic>
+      <p:sp>
+        <p:nvSpPr>
+          <p:cNvPr id="10" name="Date Placeholder 9"/>
+          <p:cNvSpPr>
+            <a:spLocks noGrp="1"/>
+          </p:cNvSpPr>
+          <p:nvPr>
+            <p:ph type="dt" sz="half" idx="10"/>
+          </p:nvPr>
+        </p:nvSpPr>
+        <p:spPr/>
+        <p:txBody>
+          <a:bodyPr/>
+          <a:lstStyle/>
+          <a:p>
+            <a:fld id="{5929E91D-E444-43FB-BAA3-D6E0747DA26C}" type="datetime1">
+              <a:rPr lang="en-IN" smtClean="0"/>
+              <a:t>05-04-2024</a:t>
+            </a:fld>
+            <a:endParaRPr lang="en-IN"/>
+          </a:p>
+        </p:txBody>
+      </p:sp>
+      <p:sp>
+        <p:nvSpPr>
+          <p:cNvPr id="11" name="Footer Placeholder 10"/>
+          <p:cNvSpPr>
+            <a:spLocks noGrp="1"/>
+          </p:cNvSpPr>
+          <p:nvPr>
+            <p:ph type="ftr" sz="quarter" idx="11"/>
+          </p:nvPr>
+        </p:nvSpPr>
+        <p:spPr/>
+        <p:txBody>
+          <a:bodyPr/>
+          <a:lstStyle/>
+          <a:p>
+            <a:r>
+              <a:rPr lang="en-IN" smtClean="0"/>
+              <a:t>Krishnan S</a:t>
+            </a:r>
+            <a:endParaRPr lang="en-IN"/>
+          </a:p>
+        </p:txBody>
+      </p:sp>
+      <p:sp>
+        <p:nvSpPr>
+          <p:cNvPr id="12" name="Slide Number Placeholder 11"/>
+          <p:cNvSpPr>
+            <a:spLocks noGrp="1"/>
+          </p:cNvSpPr>
+          <p:nvPr>
+            <p:ph type="sldNum" sz="quarter" idx="12"/>
+          </p:nvPr>
+        </p:nvSpPr>
+        <p:spPr/>
+        <p:txBody>
+          <a:bodyPr/>
+          <a:lstStyle/>
+          <a:p>
+            <a:fld id="{F03C4FAA-76B1-4134-800D-7A1771833812}" type="slidenum">
+              <a:rPr lang="en-IN" smtClean="0"/>
+              <a:t>16</a:t>
+            </a:fld>
+            <a:endParaRPr lang="en-IN"/>
+          </a:p>
+        </p:txBody>
+      </p:sp>
     </p:spTree>
     <p:extLst>
       <p:ext uri="{BB962C8B-B14F-4D97-AF65-F5344CB8AC3E}">
@@ -4211,14 +5259,14 @@
           <a:lstStyle/>
           <a:p>
             <a:r>
-              <a:rPr lang="en-IN" b="1" dirty="0"/>
+              <a:rPr lang="en-IN" b="1" u="sng" dirty="0"/>
               <a:t>Problem </a:t>
             </a:r>
             <a:r>
-              <a:rPr lang="en-IN" b="1" dirty="0" smtClean="0"/>
+              <a:rPr lang="en-IN" b="1" u="sng" dirty="0" smtClean="0"/>
               <a:t>Statement</a:t>
             </a:r>
-            <a:endParaRPr lang="en-IN" dirty="0"/>
+            <a:endParaRPr lang="en-IN" u="sng" dirty="0"/>
           </a:p>
         </p:txBody>
       </p:sp>
@@ -4279,19 +5327,30 @@
             </a:r>
           </a:p>
           <a:p>
-            <a:pPr algn="just"/>
+            <a:pPr marL="457200" indent="-457200" algn="just">
+              <a:buFont typeface="+mj-lt"/>
+              <a:buAutoNum type="arabicPeriod"/>
+            </a:pPr>
             <a:r>
               <a:rPr lang="en-US" sz="2000" dirty="0" smtClean="0"/>
               <a:t>sales</a:t>
             </a:r>
           </a:p>
           <a:p>
+            <a:pPr marL="457200" indent="-457200">
+              <a:buFont typeface="+mj-lt"/>
+              <a:buAutoNum type="arabicPeriod"/>
+            </a:pPr>
             <a:r>
               <a:rPr lang="en-US" sz="2000" dirty="0" smtClean="0"/>
               <a:t>menu</a:t>
             </a:r>
           </a:p>
           <a:p>
+            <a:pPr marL="457200" indent="-457200">
+              <a:buFont typeface="+mj-lt"/>
+              <a:buAutoNum type="arabicPeriod"/>
+            </a:pPr>
             <a:r>
               <a:rPr lang="en-US" sz="2000" dirty="0" smtClean="0"/>
               <a:t>members</a:t>
@@ -4300,36 +5359,75 @@
           </a:p>
         </p:txBody>
       </p:sp>
-      <p:cxnSp>
-        <p:nvCxnSpPr>
-          <p:cNvPr id="5" name="Straight Connector 4"/>
-          <p:cNvCxnSpPr/>
-          <p:nvPr/>
-        </p:nvCxnSpPr>
-        <p:spPr>
-          <a:xfrm flipV="1">
-            <a:off x="838200" y="1375954"/>
-            <a:ext cx="4595949" cy="17417"/>
-          </a:xfrm>
-          <a:prstGeom prst="line">
-            <a:avLst/>
-          </a:prstGeom>
-        </p:spPr>
-        <p:style>
-          <a:lnRef idx="3">
-            <a:schemeClr val="dk1"/>
-          </a:lnRef>
-          <a:fillRef idx="0">
-            <a:schemeClr val="dk1"/>
-          </a:fillRef>
-          <a:effectRef idx="2">
-            <a:schemeClr val="dk1"/>
-          </a:effectRef>
-          <a:fontRef idx="minor">
-            <a:schemeClr val="tx1"/>
-          </a:fontRef>
-        </p:style>
-      </p:cxnSp>
+      <p:sp>
+        <p:nvSpPr>
+          <p:cNvPr id="8" name="Date Placeholder 7"/>
+          <p:cNvSpPr>
+            <a:spLocks noGrp="1"/>
+          </p:cNvSpPr>
+          <p:nvPr>
+            <p:ph type="dt" sz="half" idx="10"/>
+          </p:nvPr>
+        </p:nvSpPr>
+        <p:spPr/>
+        <p:txBody>
+          <a:bodyPr/>
+          <a:lstStyle/>
+          <a:p>
+            <a:fld id="{99ED24D5-DAED-4839-BC66-4C7BA758BED0}" type="datetime1">
+              <a:rPr lang="en-IN" smtClean="0"/>
+              <a:t>05-04-2024</a:t>
+            </a:fld>
+            <a:endParaRPr lang="en-IN"/>
+          </a:p>
+        </p:txBody>
+      </p:sp>
+      <p:sp>
+        <p:nvSpPr>
+          <p:cNvPr id="9" name="Footer Placeholder 8"/>
+          <p:cNvSpPr>
+            <a:spLocks noGrp="1"/>
+          </p:cNvSpPr>
+          <p:nvPr>
+            <p:ph type="ftr" sz="quarter" idx="11"/>
+          </p:nvPr>
+        </p:nvSpPr>
+        <p:spPr/>
+        <p:txBody>
+          <a:bodyPr/>
+          <a:lstStyle/>
+          <a:p>
+            <a:r>
+              <a:rPr lang="en-IN" smtClean="0"/>
+              <a:t>Krishnan S</a:t>
+            </a:r>
+            <a:endParaRPr lang="en-IN"/>
+          </a:p>
+        </p:txBody>
+      </p:sp>
+      <p:sp>
+        <p:nvSpPr>
+          <p:cNvPr id="10" name="Slide Number Placeholder 9"/>
+          <p:cNvSpPr>
+            <a:spLocks noGrp="1"/>
+          </p:cNvSpPr>
+          <p:nvPr>
+            <p:ph type="sldNum" sz="quarter" idx="12"/>
+          </p:nvPr>
+        </p:nvSpPr>
+        <p:spPr/>
+        <p:txBody>
+          <a:bodyPr/>
+          <a:lstStyle/>
+          <a:p>
+            <a:fld id="{F03C4FAA-76B1-4134-800D-7A1771833812}" type="slidenum">
+              <a:rPr lang="en-IN" smtClean="0"/>
+              <a:t>2</a:t>
+            </a:fld>
+            <a:endParaRPr lang="en-IN"/>
+          </a:p>
+        </p:txBody>
+      </p:sp>
     </p:spTree>
     <p:extLst>
       <p:ext uri="{BB962C8B-B14F-4D97-AF65-F5344CB8AC3E}">
@@ -4376,14 +5474,14 @@
           <a:lstStyle/>
           <a:p>
             <a:r>
-              <a:rPr lang="en-IN" b="1" dirty="0"/>
+              <a:rPr lang="en-IN" b="1" u="sng" dirty="0"/>
               <a:t>Entity Relationship </a:t>
             </a:r>
             <a:r>
-              <a:rPr lang="en-IN" b="1" dirty="0" smtClean="0"/>
+              <a:rPr lang="en-IN" b="1" u="sng" dirty="0" smtClean="0"/>
               <a:t>Diagram</a:t>
             </a:r>
-            <a:endParaRPr lang="en-IN" dirty="0"/>
+            <a:endParaRPr lang="en-IN" u="sng" dirty="0"/>
           </a:p>
         </p:txBody>
       </p:sp>
@@ -4411,41 +5509,80 @@
         </p:blipFill>
         <p:spPr>
           <a:xfrm>
-            <a:off x="1175657" y="1497981"/>
-            <a:ext cx="9231086" cy="5250966"/>
+            <a:off x="983944" y="1497980"/>
+            <a:ext cx="9422799" cy="5360019"/>
           </a:xfrm>
         </p:spPr>
       </p:pic>
-      <p:cxnSp>
-        <p:nvCxnSpPr>
-          <p:cNvPr id="5" name="Straight Connector 4"/>
-          <p:cNvCxnSpPr/>
-          <p:nvPr/>
-        </p:nvCxnSpPr>
-        <p:spPr>
-          <a:xfrm>
-            <a:off x="838200" y="1323703"/>
-            <a:ext cx="6468291" cy="8708"/>
-          </a:xfrm>
-          <a:prstGeom prst="line">
-            <a:avLst/>
-          </a:prstGeom>
-        </p:spPr>
-        <p:style>
-          <a:lnRef idx="3">
-            <a:schemeClr val="dk1"/>
-          </a:lnRef>
-          <a:fillRef idx="0">
-            <a:schemeClr val="dk1"/>
-          </a:fillRef>
-          <a:effectRef idx="2">
-            <a:schemeClr val="dk1"/>
-          </a:effectRef>
-          <a:fontRef idx="minor">
-            <a:schemeClr val="tx1"/>
-          </a:fontRef>
-        </p:style>
-      </p:cxnSp>
+      <p:sp>
+        <p:nvSpPr>
+          <p:cNvPr id="8" name="Date Placeholder 7"/>
+          <p:cNvSpPr>
+            <a:spLocks noGrp="1"/>
+          </p:cNvSpPr>
+          <p:nvPr>
+            <p:ph type="dt" sz="half" idx="10"/>
+          </p:nvPr>
+        </p:nvSpPr>
+        <p:spPr/>
+        <p:txBody>
+          <a:bodyPr/>
+          <a:lstStyle/>
+          <a:p>
+            <a:fld id="{1FFF4254-8FC7-4BAC-B7B6-4E91E57EBE56}" type="datetime1">
+              <a:rPr lang="en-IN" smtClean="0"/>
+              <a:t>05-04-2024</a:t>
+            </a:fld>
+            <a:endParaRPr lang="en-IN"/>
+          </a:p>
+        </p:txBody>
+      </p:sp>
+      <p:sp>
+        <p:nvSpPr>
+          <p:cNvPr id="9" name="Footer Placeholder 8"/>
+          <p:cNvSpPr>
+            <a:spLocks noGrp="1"/>
+          </p:cNvSpPr>
+          <p:nvPr>
+            <p:ph type="ftr" sz="quarter" idx="11"/>
+          </p:nvPr>
+        </p:nvSpPr>
+        <p:spPr/>
+        <p:txBody>
+          <a:bodyPr/>
+          <a:lstStyle/>
+          <a:p>
+            <a:r>
+              <a:rPr lang="en-IN" smtClean="0"/>
+              <a:t>Krishnan S</a:t>
+            </a:r>
+            <a:endParaRPr lang="en-IN"/>
+          </a:p>
+        </p:txBody>
+      </p:sp>
+      <p:sp>
+        <p:nvSpPr>
+          <p:cNvPr id="10" name="Slide Number Placeholder 9"/>
+          <p:cNvSpPr>
+            <a:spLocks noGrp="1"/>
+          </p:cNvSpPr>
+          <p:nvPr>
+            <p:ph type="sldNum" sz="quarter" idx="12"/>
+          </p:nvPr>
+        </p:nvSpPr>
+        <p:spPr/>
+        <p:txBody>
+          <a:bodyPr/>
+          <a:lstStyle/>
+          <a:p>
+            <a:fld id="{F03C4FAA-76B1-4134-800D-7A1771833812}" type="slidenum">
+              <a:rPr lang="en-IN" smtClean="0"/>
+              <a:t>3</a:t>
+            </a:fld>
+            <a:endParaRPr lang="en-IN"/>
+          </a:p>
+        </p:txBody>
+      </p:sp>
     </p:spTree>
     <p:extLst>
       <p:ext uri="{BB962C8B-B14F-4D97-AF65-F5344CB8AC3E}">
@@ -4492,14 +5629,14 @@
           <a:lstStyle/>
           <a:p>
             <a:r>
-              <a:rPr lang="en-IN" b="1" dirty="0"/>
+              <a:rPr lang="en-IN" b="1" u="sng" dirty="0"/>
               <a:t>Case Study </a:t>
             </a:r>
             <a:r>
-              <a:rPr lang="en-IN" b="1" dirty="0" smtClean="0"/>
+              <a:rPr lang="en-IN" b="1" u="sng" dirty="0" smtClean="0"/>
               <a:t>Questions</a:t>
             </a:r>
-            <a:endParaRPr lang="en-IN" dirty="0"/>
+            <a:endParaRPr lang="en-IN" u="sng" dirty="0"/>
           </a:p>
         </p:txBody>
       </p:sp>
@@ -4626,36 +5763,75 @@
           </a:p>
         </p:txBody>
       </p:sp>
-      <p:cxnSp>
-        <p:nvCxnSpPr>
-          <p:cNvPr id="5" name="Straight Connector 4"/>
-          <p:cNvCxnSpPr/>
-          <p:nvPr/>
-        </p:nvCxnSpPr>
-        <p:spPr>
-          <a:xfrm>
-            <a:off x="838200" y="1306286"/>
-            <a:ext cx="5083629" cy="17417"/>
-          </a:xfrm>
-          <a:prstGeom prst="line">
-            <a:avLst/>
-          </a:prstGeom>
-        </p:spPr>
-        <p:style>
-          <a:lnRef idx="3">
-            <a:schemeClr val="dk1"/>
-          </a:lnRef>
-          <a:fillRef idx="0">
-            <a:schemeClr val="dk1"/>
-          </a:fillRef>
-          <a:effectRef idx="2">
-            <a:schemeClr val="dk1"/>
-          </a:effectRef>
-          <a:fontRef idx="minor">
-            <a:schemeClr val="tx1"/>
-          </a:fontRef>
-        </p:style>
-      </p:cxnSp>
+      <p:sp>
+        <p:nvSpPr>
+          <p:cNvPr id="8" name="Date Placeholder 7"/>
+          <p:cNvSpPr>
+            <a:spLocks noGrp="1"/>
+          </p:cNvSpPr>
+          <p:nvPr>
+            <p:ph type="dt" sz="half" idx="10"/>
+          </p:nvPr>
+        </p:nvSpPr>
+        <p:spPr/>
+        <p:txBody>
+          <a:bodyPr/>
+          <a:lstStyle/>
+          <a:p>
+            <a:fld id="{D7D9CD63-8673-4A3B-8AD3-F338D1234A29}" type="datetime1">
+              <a:rPr lang="en-IN" smtClean="0"/>
+              <a:t>05-04-2024</a:t>
+            </a:fld>
+            <a:endParaRPr lang="en-IN"/>
+          </a:p>
+        </p:txBody>
+      </p:sp>
+      <p:sp>
+        <p:nvSpPr>
+          <p:cNvPr id="9" name="Footer Placeholder 8"/>
+          <p:cNvSpPr>
+            <a:spLocks noGrp="1"/>
+          </p:cNvSpPr>
+          <p:nvPr>
+            <p:ph type="ftr" sz="quarter" idx="11"/>
+          </p:nvPr>
+        </p:nvSpPr>
+        <p:spPr/>
+        <p:txBody>
+          <a:bodyPr/>
+          <a:lstStyle/>
+          <a:p>
+            <a:r>
+              <a:rPr lang="en-IN" smtClean="0"/>
+              <a:t>Krishnan S</a:t>
+            </a:r>
+            <a:endParaRPr lang="en-IN"/>
+          </a:p>
+        </p:txBody>
+      </p:sp>
+      <p:sp>
+        <p:nvSpPr>
+          <p:cNvPr id="10" name="Slide Number Placeholder 9"/>
+          <p:cNvSpPr>
+            <a:spLocks noGrp="1"/>
+          </p:cNvSpPr>
+          <p:nvPr>
+            <p:ph type="sldNum" sz="quarter" idx="12"/>
+          </p:nvPr>
+        </p:nvSpPr>
+        <p:spPr/>
+        <p:txBody>
+          <a:bodyPr/>
+          <a:lstStyle/>
+          <a:p>
+            <a:fld id="{F03C4FAA-76B1-4134-800D-7A1771833812}" type="slidenum">
+              <a:rPr lang="en-IN" smtClean="0"/>
+              <a:t>4</a:t>
+            </a:fld>
+            <a:endParaRPr lang="en-IN"/>
+          </a:p>
+        </p:txBody>
+      </p:sp>
     </p:spTree>
     <p:extLst>
       <p:ext uri="{BB962C8B-B14F-4D97-AF65-F5344CB8AC3E}">
@@ -4702,12 +5878,16 @@
           <a:lstStyle/>
           <a:p>
             <a:r>
-              <a:rPr lang="en-US" sz="4000" b="1" dirty="0" smtClean="0"/>
+              <a:rPr lang="en-US" sz="4000" b="1" u="sng" dirty="0" smtClean="0"/>
               <a:t>ANSWER</a:t>
             </a:r>
             <a:r>
+              <a:rPr lang="en-US" b="1" u="sng" dirty="0" smtClean="0"/>
+              <a:t> 1</a:t>
+            </a:r>
+            <a:r>
               <a:rPr lang="en-US" b="1" dirty="0" smtClean="0"/>
-              <a:t> 1</a:t>
+              <a:t/>
             </a:r>
             <a:br>
               <a:rPr lang="en-US" b="1" dirty="0" smtClean="0"/>
@@ -4716,50 +5896,20 @@
           </a:p>
         </p:txBody>
       </p:sp>
-      <p:cxnSp>
-        <p:nvCxnSpPr>
-          <p:cNvPr id="5" name="Straight Connector 4"/>
-          <p:cNvCxnSpPr/>
-          <p:nvPr/>
-        </p:nvCxnSpPr>
+      <p:sp>
+        <p:nvSpPr>
+          <p:cNvPr id="9" name="Content Placeholder 8"/>
+          <p:cNvSpPr>
+            <a:spLocks noGrp="1"/>
+          </p:cNvSpPr>
+          <p:nvPr>
+            <p:ph idx="1"/>
+          </p:nvPr>
+        </p:nvSpPr>
         <p:spPr>
           <a:xfrm>
-            <a:off x="866502" y="984068"/>
-            <a:ext cx="2575560" cy="0"/>
-          </a:xfrm>
-          <a:prstGeom prst="line">
-            <a:avLst/>
-          </a:prstGeom>
-        </p:spPr>
-        <p:style>
-          <a:lnRef idx="3">
-            <a:schemeClr val="dk1"/>
-          </a:lnRef>
-          <a:fillRef idx="0">
-            <a:schemeClr val="dk1"/>
-          </a:fillRef>
-          <a:effectRef idx="2">
-            <a:schemeClr val="dk1"/>
-          </a:effectRef>
-          <a:fontRef idx="minor">
-            <a:schemeClr val="tx1"/>
-          </a:fontRef>
-        </p:style>
-      </p:cxnSp>
-      <p:sp>
-        <p:nvSpPr>
-          <p:cNvPr id="9" name="Content Placeholder 8"/>
-          <p:cNvSpPr>
-            <a:spLocks noGrp="1"/>
-          </p:cNvSpPr>
-          <p:nvPr>
-            <p:ph idx="1"/>
-          </p:nvPr>
-        </p:nvSpPr>
-        <p:spPr>
-          <a:xfrm>
-            <a:off x="414746" y="1149531"/>
-            <a:ext cx="11362508" cy="4351338"/>
+            <a:off x="838200" y="1149531"/>
+            <a:ext cx="10515600" cy="1088572"/>
           </a:xfrm>
         </p:spPr>
         <p:txBody>
@@ -4801,14 +5951,83 @@
         </p:blipFill>
         <p:spPr>
           <a:xfrm>
-            <a:off x="2766078" y="1603012"/>
-            <a:ext cx="6659843" cy="5254008"/>
+            <a:off x="3033313" y="1523990"/>
+            <a:ext cx="6125373" cy="4832360"/>
           </a:xfrm>
           <a:prstGeom prst="rect">
             <a:avLst/>
           </a:prstGeom>
         </p:spPr>
       </p:pic>
+      <p:sp>
+        <p:nvSpPr>
+          <p:cNvPr id="7" name="Date Placeholder 6"/>
+          <p:cNvSpPr>
+            <a:spLocks noGrp="1"/>
+          </p:cNvSpPr>
+          <p:nvPr>
+            <p:ph type="dt" sz="half" idx="10"/>
+          </p:nvPr>
+        </p:nvSpPr>
+        <p:spPr/>
+        <p:txBody>
+          <a:bodyPr/>
+          <a:lstStyle/>
+          <a:p>
+            <a:fld id="{0E0C473E-4CA4-464F-BBB5-3A97B8B845DC}" type="datetime1">
+              <a:rPr lang="en-IN" smtClean="0"/>
+              <a:t>05-04-2024</a:t>
+            </a:fld>
+            <a:endParaRPr lang="en-IN"/>
+          </a:p>
+        </p:txBody>
+      </p:sp>
+      <p:sp>
+        <p:nvSpPr>
+          <p:cNvPr id="8" name="Footer Placeholder 7"/>
+          <p:cNvSpPr>
+            <a:spLocks noGrp="1"/>
+          </p:cNvSpPr>
+          <p:nvPr>
+            <p:ph type="ftr" sz="quarter" idx="11"/>
+          </p:nvPr>
+        </p:nvSpPr>
+        <p:spPr/>
+        <p:txBody>
+          <a:bodyPr/>
+          <a:lstStyle/>
+          <a:p>
+            <a:r>
+              <a:rPr lang="en-IN" smtClean="0"/>
+              <a:t>Krishnan S</a:t>
+            </a:r>
+            <a:endParaRPr lang="en-IN"/>
+          </a:p>
+        </p:txBody>
+      </p:sp>
+      <p:sp>
+        <p:nvSpPr>
+          <p:cNvPr id="11" name="Slide Number Placeholder 10"/>
+          <p:cNvSpPr>
+            <a:spLocks noGrp="1"/>
+          </p:cNvSpPr>
+          <p:nvPr>
+            <p:ph type="sldNum" sz="quarter" idx="12"/>
+          </p:nvPr>
+        </p:nvSpPr>
+        <p:spPr/>
+        <p:txBody>
+          <a:bodyPr/>
+          <a:lstStyle/>
+          <a:p>
+            <a:fld id="{F03C4FAA-76B1-4134-800D-7A1771833812}" type="slidenum">
+              <a:rPr lang="en-IN" smtClean="0"/>
+              <a:t>5</a:t>
+            </a:fld>
+            <a:endParaRPr lang="en-IN"/>
+          </a:p>
+        </p:txBody>
+      </p:sp>
     </p:spTree>
     <p:extLst>
       <p:ext uri="{BB962C8B-B14F-4D97-AF65-F5344CB8AC3E}">
@@ -4860,12 +6079,16 @@
           <a:lstStyle/>
           <a:p>
             <a:r>
-              <a:rPr lang="en-US" sz="4000" b="1" dirty="0" smtClean="0"/>
+              <a:rPr lang="en-US" sz="4000" b="1" u="sng" dirty="0" smtClean="0"/>
               <a:t>ANSWER</a:t>
             </a:r>
             <a:r>
+              <a:rPr lang="en-US" b="1" u="sng" dirty="0" smtClean="0"/>
+              <a:t> 2</a:t>
+            </a:r>
+            <a:r>
               <a:rPr lang="en-US" b="1" dirty="0" smtClean="0"/>
-              <a:t> 2</a:t>
+              <a:t/>
             </a:r>
             <a:br>
               <a:rPr lang="en-US" b="1" dirty="0" smtClean="0"/>
@@ -4874,50 +6097,20 @@
           </a:p>
         </p:txBody>
       </p:sp>
-      <p:cxnSp>
-        <p:nvCxnSpPr>
-          <p:cNvPr id="5" name="Straight Connector 4"/>
-          <p:cNvCxnSpPr/>
-          <p:nvPr/>
-        </p:nvCxnSpPr>
+      <p:sp>
+        <p:nvSpPr>
+          <p:cNvPr id="7" name="Content Placeholder 6"/>
+          <p:cNvSpPr>
+            <a:spLocks noGrp="1"/>
+          </p:cNvSpPr>
+          <p:nvPr>
+            <p:ph idx="1"/>
+          </p:nvPr>
+        </p:nvSpPr>
         <p:spPr>
           <a:xfrm>
-            <a:off x="838200" y="966652"/>
-            <a:ext cx="2627811" cy="0"/>
-          </a:xfrm>
-          <a:prstGeom prst="line">
-            <a:avLst/>
-          </a:prstGeom>
-        </p:spPr>
-        <p:style>
-          <a:lnRef idx="3">
-            <a:schemeClr val="dk1"/>
-          </a:lnRef>
-          <a:fillRef idx="0">
-            <a:schemeClr val="dk1"/>
-          </a:fillRef>
-          <a:effectRef idx="2">
-            <a:schemeClr val="dk1"/>
-          </a:effectRef>
-          <a:fontRef idx="minor">
-            <a:schemeClr val="tx1"/>
-          </a:fontRef>
-        </p:style>
-      </p:cxnSp>
-      <p:sp>
-        <p:nvSpPr>
-          <p:cNvPr id="7" name="Content Placeholder 6"/>
-          <p:cNvSpPr>
-            <a:spLocks noGrp="1"/>
-          </p:cNvSpPr>
-          <p:nvPr>
-            <p:ph idx="1"/>
-          </p:nvPr>
-        </p:nvSpPr>
-        <p:spPr>
-          <a:xfrm>
-            <a:off x="420187" y="1050562"/>
-            <a:ext cx="11353801" cy="4351338"/>
+            <a:off x="838200" y="1050562"/>
+            <a:ext cx="10515600" cy="804364"/>
           </a:xfrm>
         </p:spPr>
         <p:txBody>
@@ -4959,14 +6152,83 @@
         </p:blipFill>
         <p:spPr>
           <a:xfrm>
-            <a:off x="770668" y="1559764"/>
-            <a:ext cx="10650663" cy="5158688"/>
+            <a:off x="1547929" y="1629433"/>
+            <a:ext cx="9096142" cy="4719116"/>
           </a:xfrm>
           <a:prstGeom prst="rect">
             <a:avLst/>
           </a:prstGeom>
         </p:spPr>
       </p:pic>
+      <p:sp>
+        <p:nvSpPr>
+          <p:cNvPr id="9" name="Date Placeholder 8"/>
+          <p:cNvSpPr>
+            <a:spLocks noGrp="1"/>
+          </p:cNvSpPr>
+          <p:nvPr>
+            <p:ph type="dt" sz="half" idx="10"/>
+          </p:nvPr>
+        </p:nvSpPr>
+        <p:spPr/>
+        <p:txBody>
+          <a:bodyPr/>
+          <a:lstStyle/>
+          <a:p>
+            <a:fld id="{8FD02420-C37A-4639-A621-094358CADF7B}" type="datetime1">
+              <a:rPr lang="en-IN" smtClean="0"/>
+              <a:t>05-04-2024</a:t>
+            </a:fld>
+            <a:endParaRPr lang="en-IN"/>
+          </a:p>
+        </p:txBody>
+      </p:sp>
+      <p:sp>
+        <p:nvSpPr>
+          <p:cNvPr id="10" name="Footer Placeholder 9"/>
+          <p:cNvSpPr>
+            <a:spLocks noGrp="1"/>
+          </p:cNvSpPr>
+          <p:nvPr>
+            <p:ph type="ftr" sz="quarter" idx="11"/>
+          </p:nvPr>
+        </p:nvSpPr>
+        <p:spPr/>
+        <p:txBody>
+          <a:bodyPr/>
+          <a:lstStyle/>
+          <a:p>
+            <a:r>
+              <a:rPr lang="en-IN" smtClean="0"/>
+              <a:t>Krishnan S</a:t>
+            </a:r>
+            <a:endParaRPr lang="en-IN"/>
+          </a:p>
+        </p:txBody>
+      </p:sp>
+      <p:sp>
+        <p:nvSpPr>
+          <p:cNvPr id="11" name="Slide Number Placeholder 10"/>
+          <p:cNvSpPr>
+            <a:spLocks noGrp="1"/>
+          </p:cNvSpPr>
+          <p:nvPr>
+            <p:ph type="sldNum" sz="quarter" idx="12"/>
+          </p:nvPr>
+        </p:nvSpPr>
+        <p:spPr/>
+        <p:txBody>
+          <a:bodyPr/>
+          <a:lstStyle/>
+          <a:p>
+            <a:fld id="{F03C4FAA-76B1-4134-800D-7A1771833812}" type="slidenum">
+              <a:rPr lang="en-IN" smtClean="0"/>
+              <a:t>6</a:t>
+            </a:fld>
+            <a:endParaRPr lang="en-IN"/>
+          </a:p>
+        </p:txBody>
+      </p:sp>
     </p:spTree>
     <p:extLst>
       <p:ext uri="{BB962C8B-B14F-4D97-AF65-F5344CB8AC3E}">
@@ -5018,12 +6280,16 @@
           <a:lstStyle/>
           <a:p>
             <a:r>
-              <a:rPr lang="en-US" sz="4000" b="1" dirty="0" smtClean="0"/>
+              <a:rPr lang="en-US" sz="4000" b="1" u="sng" dirty="0" smtClean="0"/>
               <a:t>ANSWER</a:t>
             </a:r>
             <a:r>
+              <a:rPr lang="en-US" b="1" u="sng" dirty="0" smtClean="0"/>
+              <a:t> 3</a:t>
+            </a:r>
+            <a:r>
               <a:rPr lang="en-US" b="1" dirty="0" smtClean="0"/>
-              <a:t> 3</a:t>
+              <a:t/>
             </a:r>
             <a:br>
               <a:rPr lang="en-US" b="1" dirty="0" smtClean="0"/>
@@ -5032,36 +6298,6 @@
           </a:p>
         </p:txBody>
       </p:sp>
-      <p:cxnSp>
-        <p:nvCxnSpPr>
-          <p:cNvPr id="5" name="Straight Connector 4"/>
-          <p:cNvCxnSpPr/>
-          <p:nvPr/>
-        </p:nvCxnSpPr>
-        <p:spPr>
-          <a:xfrm flipV="1">
-            <a:off x="838200" y="1019197"/>
-            <a:ext cx="2653937" cy="8709"/>
-          </a:xfrm>
-          <a:prstGeom prst="line">
-            <a:avLst/>
-          </a:prstGeom>
-        </p:spPr>
-        <p:style>
-          <a:lnRef idx="3">
-            <a:schemeClr val="dk1"/>
-          </a:lnRef>
-          <a:fillRef idx="0">
-            <a:schemeClr val="dk1"/>
-          </a:fillRef>
-          <a:effectRef idx="2">
-            <a:schemeClr val="dk1"/>
-          </a:effectRef>
-          <a:fontRef idx="minor">
-            <a:schemeClr val="tx1"/>
-          </a:fontRef>
-        </p:style>
-      </p:cxnSp>
       <p:sp>
         <p:nvSpPr>
           <p:cNvPr id="7" name="Content Placeholder 6"/>
@@ -5074,8 +6310,8 @@
         </p:nvSpPr>
         <p:spPr>
           <a:xfrm>
-            <a:off x="437607" y="1198608"/>
-            <a:ext cx="11318964" cy="4351338"/>
+            <a:off x="838199" y="1198608"/>
+            <a:ext cx="10515601" cy="4351338"/>
           </a:xfrm>
         </p:spPr>
         <p:txBody>
@@ -5117,14 +6353,83 @@
         </p:blipFill>
         <p:spPr>
           <a:xfrm>
-            <a:off x="1750583" y="1626981"/>
-            <a:ext cx="8690833" cy="5231019"/>
+            <a:off x="2142388" y="1596986"/>
+            <a:ext cx="7907223" cy="4759364"/>
           </a:xfrm>
           <a:prstGeom prst="rect">
             <a:avLst/>
           </a:prstGeom>
         </p:spPr>
       </p:pic>
+      <p:sp>
+        <p:nvSpPr>
+          <p:cNvPr id="9" name="Date Placeholder 8"/>
+          <p:cNvSpPr>
+            <a:spLocks noGrp="1"/>
+          </p:cNvSpPr>
+          <p:nvPr>
+            <p:ph type="dt" sz="half" idx="10"/>
+          </p:nvPr>
+        </p:nvSpPr>
+        <p:spPr/>
+        <p:txBody>
+          <a:bodyPr/>
+          <a:lstStyle/>
+          <a:p>
+            <a:fld id="{E4D6C50E-3039-4A53-81A4-CA1E60BD9A56}" type="datetime1">
+              <a:rPr lang="en-IN" smtClean="0"/>
+              <a:t>05-04-2024</a:t>
+            </a:fld>
+            <a:endParaRPr lang="en-IN"/>
+          </a:p>
+        </p:txBody>
+      </p:sp>
+      <p:sp>
+        <p:nvSpPr>
+          <p:cNvPr id="10" name="Footer Placeholder 9"/>
+          <p:cNvSpPr>
+            <a:spLocks noGrp="1"/>
+          </p:cNvSpPr>
+          <p:nvPr>
+            <p:ph type="ftr" sz="quarter" idx="11"/>
+          </p:nvPr>
+        </p:nvSpPr>
+        <p:spPr/>
+        <p:txBody>
+          <a:bodyPr/>
+          <a:lstStyle/>
+          <a:p>
+            <a:r>
+              <a:rPr lang="en-IN" smtClean="0"/>
+              <a:t>Krishnan S</a:t>
+            </a:r>
+            <a:endParaRPr lang="en-IN"/>
+          </a:p>
+        </p:txBody>
+      </p:sp>
+      <p:sp>
+        <p:nvSpPr>
+          <p:cNvPr id="11" name="Slide Number Placeholder 10"/>
+          <p:cNvSpPr>
+            <a:spLocks noGrp="1"/>
+          </p:cNvSpPr>
+          <p:nvPr>
+            <p:ph type="sldNum" sz="quarter" idx="12"/>
+          </p:nvPr>
+        </p:nvSpPr>
+        <p:spPr/>
+        <p:txBody>
+          <a:bodyPr/>
+          <a:lstStyle/>
+          <a:p>
+            <a:fld id="{F03C4FAA-76B1-4134-800D-7A1771833812}" type="slidenum">
+              <a:rPr lang="en-IN" smtClean="0"/>
+              <a:t>7</a:t>
+            </a:fld>
+            <a:endParaRPr lang="en-IN"/>
+          </a:p>
+        </p:txBody>
+      </p:sp>
     </p:spTree>
     <p:extLst>
       <p:ext uri="{BB962C8B-B14F-4D97-AF65-F5344CB8AC3E}">
@@ -5171,12 +6476,16 @@
           <a:lstStyle/>
           <a:p>
             <a:r>
-              <a:rPr lang="en-US" sz="4000" b="1" dirty="0" smtClean="0"/>
+              <a:rPr lang="en-US" sz="4000" b="1" u="sng" dirty="0" smtClean="0"/>
               <a:t>ANSWER</a:t>
             </a:r>
             <a:r>
+              <a:rPr lang="en-US" b="1" u="sng" dirty="0" smtClean="0"/>
+              <a:t> 4</a:t>
+            </a:r>
+            <a:r>
               <a:rPr lang="en-US" b="1" dirty="0" smtClean="0"/>
-              <a:t> 4</a:t>
+              <a:t/>
             </a:r>
             <a:br>
               <a:rPr lang="en-US" b="1" dirty="0" smtClean="0"/>
@@ -5185,50 +6494,20 @@
           </a:p>
         </p:txBody>
       </p:sp>
-      <p:cxnSp>
-        <p:nvCxnSpPr>
-          <p:cNvPr id="6" name="Straight Connector 5"/>
-          <p:cNvCxnSpPr/>
-          <p:nvPr/>
-        </p:nvCxnSpPr>
+      <p:sp>
+        <p:nvSpPr>
+          <p:cNvPr id="7" name="Content Placeholder 6"/>
+          <p:cNvSpPr>
+            <a:spLocks noGrp="1"/>
+          </p:cNvSpPr>
+          <p:nvPr>
+            <p:ph idx="1"/>
+          </p:nvPr>
+        </p:nvSpPr>
         <p:spPr>
           <a:xfrm>
-            <a:off x="855723" y="940525"/>
-            <a:ext cx="2575560" cy="0"/>
-          </a:xfrm>
-          <a:prstGeom prst="line">
-            <a:avLst/>
-          </a:prstGeom>
-        </p:spPr>
-        <p:style>
-          <a:lnRef idx="3">
-            <a:schemeClr val="dk1"/>
-          </a:lnRef>
-          <a:fillRef idx="0">
-            <a:schemeClr val="dk1"/>
-          </a:fillRef>
-          <a:effectRef idx="2">
-            <a:schemeClr val="dk1"/>
-          </a:effectRef>
-          <a:fontRef idx="minor">
-            <a:schemeClr val="tx1"/>
-          </a:fontRef>
-        </p:style>
-      </p:cxnSp>
-      <p:sp>
-        <p:nvSpPr>
-          <p:cNvPr id="7" name="Content Placeholder 6"/>
-          <p:cNvSpPr>
-            <a:spLocks noGrp="1"/>
-          </p:cNvSpPr>
-          <p:nvPr>
-            <p:ph idx="1"/>
-          </p:nvPr>
-        </p:nvSpPr>
-        <p:spPr>
-          <a:xfrm>
-            <a:off x="394063" y="1050857"/>
-            <a:ext cx="11501846" cy="4351338"/>
+            <a:off x="855723" y="1050857"/>
+            <a:ext cx="10498077" cy="4351338"/>
           </a:xfrm>
         </p:spPr>
         <p:txBody>
@@ -5270,14 +6549,83 @@
         </p:blipFill>
         <p:spPr>
           <a:xfrm>
-            <a:off x="2025685" y="1801019"/>
-            <a:ext cx="8140629" cy="4909620"/>
+            <a:off x="2301711" y="1801019"/>
+            <a:ext cx="7588578" cy="4576678"/>
           </a:xfrm>
           <a:prstGeom prst="rect">
             <a:avLst/>
           </a:prstGeom>
         </p:spPr>
       </p:pic>
+      <p:sp>
+        <p:nvSpPr>
+          <p:cNvPr id="9" name="Date Placeholder 8"/>
+          <p:cNvSpPr>
+            <a:spLocks noGrp="1"/>
+          </p:cNvSpPr>
+          <p:nvPr>
+            <p:ph type="dt" sz="half" idx="10"/>
+          </p:nvPr>
+        </p:nvSpPr>
+        <p:spPr/>
+        <p:txBody>
+          <a:bodyPr/>
+          <a:lstStyle/>
+          <a:p>
+            <a:fld id="{3624197C-67D6-46C2-9C08-72103A7829C3}" type="datetime1">
+              <a:rPr lang="en-IN" smtClean="0"/>
+              <a:t>05-04-2024</a:t>
+            </a:fld>
+            <a:endParaRPr lang="en-IN"/>
+          </a:p>
+        </p:txBody>
+      </p:sp>
+      <p:sp>
+        <p:nvSpPr>
+          <p:cNvPr id="10" name="Footer Placeholder 9"/>
+          <p:cNvSpPr>
+            <a:spLocks noGrp="1"/>
+          </p:cNvSpPr>
+          <p:nvPr>
+            <p:ph type="ftr" sz="quarter" idx="11"/>
+          </p:nvPr>
+        </p:nvSpPr>
+        <p:spPr/>
+        <p:txBody>
+          <a:bodyPr/>
+          <a:lstStyle/>
+          <a:p>
+            <a:r>
+              <a:rPr lang="en-IN" smtClean="0"/>
+              <a:t>Krishnan S</a:t>
+            </a:r>
+            <a:endParaRPr lang="en-IN"/>
+          </a:p>
+        </p:txBody>
+      </p:sp>
+      <p:sp>
+        <p:nvSpPr>
+          <p:cNvPr id="11" name="Slide Number Placeholder 10"/>
+          <p:cNvSpPr>
+            <a:spLocks noGrp="1"/>
+          </p:cNvSpPr>
+          <p:nvPr>
+            <p:ph type="sldNum" sz="quarter" idx="12"/>
+          </p:nvPr>
+        </p:nvSpPr>
+        <p:spPr/>
+        <p:txBody>
+          <a:bodyPr/>
+          <a:lstStyle/>
+          <a:p>
+            <a:fld id="{F03C4FAA-76B1-4134-800D-7A1771833812}" type="slidenum">
+              <a:rPr lang="en-IN" smtClean="0"/>
+              <a:t>8</a:t>
+            </a:fld>
+            <a:endParaRPr lang="en-IN"/>
+          </a:p>
+        </p:txBody>
+      </p:sp>
     </p:spTree>
     <p:extLst>
       <p:ext uri="{BB962C8B-B14F-4D97-AF65-F5344CB8AC3E}">
@@ -5329,7 +6677,7 @@
           <a:lstStyle/>
           <a:p>
             <a:r>
-              <a:rPr lang="en-US" sz="4000" b="1" dirty="0" smtClean="0"/>
+              <a:rPr lang="en-US" sz="4000" b="1" u="sng" dirty="0" smtClean="0"/>
               <a:t>ANSWER 5</a:t>
             </a:r>
             <a:r>
@@ -5343,50 +6691,20 @@
           </a:p>
         </p:txBody>
       </p:sp>
-      <p:cxnSp>
-        <p:nvCxnSpPr>
-          <p:cNvPr id="5" name="Straight Connector 4"/>
-          <p:cNvCxnSpPr/>
-          <p:nvPr/>
-        </p:nvCxnSpPr>
+      <p:sp>
+        <p:nvSpPr>
+          <p:cNvPr id="7" name="Content Placeholder 6"/>
+          <p:cNvSpPr>
+            <a:spLocks noGrp="1"/>
+          </p:cNvSpPr>
+          <p:nvPr>
+            <p:ph idx="1"/>
+          </p:nvPr>
+        </p:nvSpPr>
         <p:spPr>
           <a:xfrm>
-            <a:off x="838200" y="1027906"/>
-            <a:ext cx="2662646" cy="0"/>
-          </a:xfrm>
-          <a:prstGeom prst="line">
-            <a:avLst/>
-          </a:prstGeom>
-        </p:spPr>
-        <p:style>
-          <a:lnRef idx="3">
-            <a:schemeClr val="dk1"/>
-          </a:lnRef>
-          <a:fillRef idx="0">
-            <a:schemeClr val="dk1"/>
-          </a:fillRef>
-          <a:effectRef idx="2">
-            <a:schemeClr val="dk1"/>
-          </a:effectRef>
-          <a:fontRef idx="minor">
-            <a:schemeClr val="tx1"/>
-          </a:fontRef>
-        </p:style>
-      </p:cxnSp>
-      <p:sp>
-        <p:nvSpPr>
-          <p:cNvPr id="7" name="Content Placeholder 6"/>
-          <p:cNvSpPr>
-            <a:spLocks noGrp="1"/>
-          </p:cNvSpPr>
-          <p:nvPr>
-            <p:ph idx="1"/>
-          </p:nvPr>
-        </p:nvSpPr>
-        <p:spPr>
-          <a:xfrm>
-            <a:off x="498566" y="1155065"/>
-            <a:ext cx="11240588" cy="4351338"/>
+            <a:off x="838200" y="1027905"/>
+            <a:ext cx="10515600" cy="1396546"/>
           </a:xfrm>
         </p:spPr>
         <p:txBody>
@@ -5428,14 +6746,83 @@
         </p:blipFill>
         <p:spPr>
           <a:xfrm>
-            <a:off x="2333896" y="1538573"/>
-            <a:ext cx="7524207" cy="5319427"/>
+            <a:off x="2629988" y="1521157"/>
+            <a:ext cx="6932024" cy="4900768"/>
           </a:xfrm>
           <a:prstGeom prst="rect">
             <a:avLst/>
           </a:prstGeom>
         </p:spPr>
       </p:pic>
+      <p:sp>
+        <p:nvSpPr>
+          <p:cNvPr id="9" name="Date Placeholder 8"/>
+          <p:cNvSpPr>
+            <a:spLocks noGrp="1"/>
+          </p:cNvSpPr>
+          <p:nvPr>
+            <p:ph type="dt" sz="half" idx="10"/>
+          </p:nvPr>
+        </p:nvSpPr>
+        <p:spPr/>
+        <p:txBody>
+          <a:bodyPr/>
+          <a:lstStyle/>
+          <a:p>
+            <a:fld id="{943E9B9E-292F-4791-8CDD-A55FA4E126F6}" type="datetime1">
+              <a:rPr lang="en-IN" smtClean="0"/>
+              <a:t>05-04-2024</a:t>
+            </a:fld>
+            <a:endParaRPr lang="en-IN"/>
+          </a:p>
+        </p:txBody>
+      </p:sp>
+      <p:sp>
+        <p:nvSpPr>
+          <p:cNvPr id="10" name="Footer Placeholder 9"/>
+          <p:cNvSpPr>
+            <a:spLocks noGrp="1"/>
+          </p:cNvSpPr>
+          <p:nvPr>
+            <p:ph type="ftr" sz="quarter" idx="11"/>
+          </p:nvPr>
+        </p:nvSpPr>
+        <p:spPr/>
+        <p:txBody>
+          <a:bodyPr/>
+          <a:lstStyle/>
+          <a:p>
+            <a:r>
+              <a:rPr lang="en-IN" smtClean="0"/>
+              <a:t>Krishnan S</a:t>
+            </a:r>
+            <a:endParaRPr lang="en-IN"/>
+          </a:p>
+        </p:txBody>
+      </p:sp>
+      <p:sp>
+        <p:nvSpPr>
+          <p:cNvPr id="11" name="Slide Number Placeholder 10"/>
+          <p:cNvSpPr>
+            <a:spLocks noGrp="1"/>
+          </p:cNvSpPr>
+          <p:nvPr>
+            <p:ph type="sldNum" sz="quarter" idx="12"/>
+          </p:nvPr>
+        </p:nvSpPr>
+        <p:spPr/>
+        <p:txBody>
+          <a:bodyPr/>
+          <a:lstStyle/>
+          <a:p>
+            <a:fld id="{F03C4FAA-76B1-4134-800D-7A1771833812}" type="slidenum">
+              <a:rPr lang="en-IN" smtClean="0"/>
+              <a:t>9</a:t>
+            </a:fld>
+            <a:endParaRPr lang="en-IN"/>
+          </a:p>
+        </p:txBody>
+      </p:sp>
     </p:spTree>
     <p:extLst>
       <p:ext uri="{BB962C8B-B14F-4D97-AF65-F5344CB8AC3E}">
@@ -5708,4 +7095,526 @@
     </a:ext>
   </a:extLst>
 </a:theme>
+</file>
+
+<file path=ppt/theme/theme2.xml><?xml version="1.0" encoding="utf-8"?>
+<a:theme xmlns:a="http://schemas.openxmlformats.org/drawingml/2006/main" name="Office Theme">
+  <a:themeElements>
+    <a:clrScheme name="Office">
+      <a:dk1>
+        <a:sysClr val="windowText" lastClr="000000"/>
+      </a:dk1>
+      <a:lt1>
+        <a:sysClr val="window" lastClr="FFFFFF"/>
+      </a:lt1>
+      <a:dk2>
+        <a:srgbClr val="44546A"/>
+      </a:dk2>
+      <a:lt2>
+        <a:srgbClr val="E7E6E6"/>
+      </a:lt2>
+      <a:accent1>
+        <a:srgbClr val="5B9BD5"/>
+      </a:accent1>
+      <a:accent2>
+        <a:srgbClr val="ED7D31"/>
+      </a:accent2>
+      <a:accent3>
+        <a:srgbClr val="A5A5A5"/>
+      </a:accent3>
+      <a:accent4>
+        <a:srgbClr val="FFC000"/>
+      </a:accent4>
+      <a:accent5>
+        <a:srgbClr val="4472C4"/>
+      </a:accent5>
+      <a:accent6>
+        <a:srgbClr val="70AD47"/>
+      </a:accent6>
+      <a:hlink>
+        <a:srgbClr val="0563C1"/>
+      </a:hlink>
+      <a:folHlink>
+        <a:srgbClr val="954F72"/>
+      </a:folHlink>
+    </a:clrScheme>
+    <a:fontScheme name="Office">
+      <a:majorFont>
+        <a:latin typeface="Calibri Light" panose="020F0302020204030204"/>
+        <a:ea typeface=""/>
+        <a:cs typeface=""/>
+        <a:font script="Jpan" typeface="ＭＳ Ｐゴシック"/>
+        <a:font script="Hang" typeface="맑은 고딕"/>
+        <a:font script="Hans" typeface="宋体"/>
+        <a:font script="Hant" typeface="新細明體"/>
+        <a:font script="Arab" typeface="Times New Roman"/>
+        <a:font script="Hebr" typeface="Times New Roman"/>
+        <a:font script="Thai" typeface="Angsana New"/>
+        <a:font script="Ethi" typeface="Nyala"/>
+        <a:font script="Beng" typeface="Vrinda"/>
+        <a:font script="Gujr" typeface="Shruti"/>
+        <a:font script="Khmr" typeface="MoolBoran"/>
+        <a:font script="Knda" typeface="Tunga"/>
+        <a:font script="Guru" typeface="Raavi"/>
+        <a:font script="Cans" typeface="Euphemia"/>
+        <a:font script="Cher" typeface="Plantagenet Cherokee"/>
+        <a:font script="Yiii" typeface="Microsoft Yi Baiti"/>
+        <a:font script="Tibt" typeface="Microsoft Himalaya"/>
+        <a:font script="Thaa" typeface="MV Boli"/>
+        <a:font script="Deva" typeface="Mangal"/>
+        <a:font script="Telu" typeface="Gautami"/>
+        <a:font script="Taml" typeface="Latha"/>
+        <a:font script="Syrc" typeface="Estrangelo Edessa"/>
+        <a:font script="Orya" typeface="Kalinga"/>
+        <a:font script="Mlym" typeface="Kartika"/>
+        <a:font script="Laoo" typeface="DokChampa"/>
+        <a:font script="Sinh" typeface="Iskoola Pota"/>
+        <a:font script="Mong" typeface="Mongolian Baiti"/>
+        <a:font script="Viet" typeface="Times New Roman"/>
+        <a:font script="Uigh" typeface="Microsoft Uighur"/>
+        <a:font script="Geor" typeface="Sylfaen"/>
+      </a:majorFont>
+      <a:minorFont>
+        <a:latin typeface="Calibri" panose="020F0502020204030204"/>
+        <a:ea typeface=""/>
+        <a:cs typeface=""/>
+        <a:font script="Jpan" typeface="ＭＳ Ｐゴシック"/>
+        <a:font script="Hang" typeface="맑은 고딕"/>
+        <a:font script="Hans" typeface="宋体"/>
+        <a:font script="Hant" typeface="新細明體"/>
+        <a:font script="Arab" typeface="Arial"/>
+        <a:font script="Hebr" typeface="Arial"/>
+        <a:font script="Thai" typeface="Cordia New"/>
+        <a:font script="Ethi" typeface="Nyala"/>
+        <a:font script="Beng" typeface="Vrinda"/>
+        <a:font script="Gujr" typeface="Shruti"/>
+        <a:font script="Khmr" typeface="DaunPenh"/>
+        <a:font script="Knda" typeface="Tunga"/>
+        <a:font script="Guru" typeface="Raavi"/>
+        <a:font script="Cans" typeface="Euphemia"/>
+        <a:font script="Cher" typeface="Plantagenet Cherokee"/>
+        <a:font script="Yiii" typeface="Microsoft Yi Baiti"/>
+        <a:font script="Tibt" typeface="Microsoft Himalaya"/>
+        <a:font script="Thaa" typeface="MV Boli"/>
+        <a:font script="Deva" typeface="Mangal"/>
+        <a:font script="Telu" typeface="Gautami"/>
+        <a:font script="Taml" typeface="Latha"/>
+        <a:font script="Syrc" typeface="Estrangelo Edessa"/>
+        <a:font script="Orya" typeface="Kalinga"/>
+        <a:font script="Mlym" typeface="Kartika"/>
+        <a:font script="Laoo" typeface="DokChampa"/>
+        <a:font script="Sinh" typeface="Iskoola Pota"/>
+        <a:font script="Mong" typeface="Mongolian Baiti"/>
+        <a:font script="Viet" typeface="Arial"/>
+        <a:font script="Uigh" typeface="Microsoft Uighur"/>
+        <a:font script="Geor" typeface="Sylfaen"/>
+      </a:minorFont>
+    </a:fontScheme>
+    <a:fmtScheme name="Office">
+      <a:fillStyleLst>
+        <a:solidFill>
+          <a:schemeClr val="phClr"/>
+        </a:solidFill>
+        <a:gradFill rotWithShape="1">
+          <a:gsLst>
+            <a:gs pos="0">
+              <a:schemeClr val="phClr">
+                <a:lumMod val="110000"/>
+                <a:satMod val="105000"/>
+                <a:tint val="67000"/>
+              </a:schemeClr>
+            </a:gs>
+            <a:gs pos="50000">
+              <a:schemeClr val="phClr">
+                <a:lumMod val="105000"/>
+                <a:satMod val="103000"/>
+                <a:tint val="73000"/>
+              </a:schemeClr>
+            </a:gs>
+            <a:gs pos="100000">
+              <a:schemeClr val="phClr">
+                <a:lumMod val="105000"/>
+                <a:satMod val="109000"/>
+                <a:tint val="81000"/>
+              </a:schemeClr>
+            </a:gs>
+          </a:gsLst>
+          <a:lin ang="5400000" scaled="0"/>
+        </a:gradFill>
+        <a:gradFill rotWithShape="1">
+          <a:gsLst>
+            <a:gs pos="0">
+              <a:schemeClr val="phClr">
+                <a:satMod val="103000"/>
+                <a:lumMod val="102000"/>
+                <a:tint val="94000"/>
+              </a:schemeClr>
+            </a:gs>
+            <a:gs pos="50000">
+              <a:schemeClr val="phClr">
+                <a:satMod val="110000"/>
+                <a:lumMod val="100000"/>
+                <a:shade val="100000"/>
+              </a:schemeClr>
+            </a:gs>
+            <a:gs pos="100000">
+              <a:schemeClr val="phClr">
+                <a:lumMod val="99000"/>
+                <a:satMod val="120000"/>
+                <a:shade val="78000"/>
+              </a:schemeClr>
+            </a:gs>
+          </a:gsLst>
+          <a:lin ang="5400000" scaled="0"/>
+        </a:gradFill>
+      </a:fillStyleLst>
+      <a:lnStyleLst>
+        <a:ln w="6350" cap="flat" cmpd="sng" algn="ctr">
+          <a:solidFill>
+            <a:schemeClr val="phClr"/>
+          </a:solidFill>
+          <a:prstDash val="solid"/>
+          <a:miter lim="800000"/>
+        </a:ln>
+        <a:ln w="12700" cap="flat" cmpd="sng" algn="ctr">
+          <a:solidFill>
+            <a:schemeClr val="phClr"/>
+          </a:solidFill>
+          <a:prstDash val="solid"/>
+          <a:miter lim="800000"/>
+        </a:ln>
+        <a:ln w="19050" cap="flat" cmpd="sng" algn="ctr">
+          <a:solidFill>
+            <a:schemeClr val="phClr"/>
+          </a:solidFill>
+          <a:prstDash val="solid"/>
+          <a:miter lim="800000"/>
+        </a:ln>
+      </a:lnStyleLst>
+      <a:effectStyleLst>
+        <a:effectStyle>
+          <a:effectLst/>
+        </a:effectStyle>
+        <a:effectStyle>
+          <a:effectLst/>
+        </a:effectStyle>
+        <a:effectStyle>
+          <a:effectLst>
+            <a:outerShdw blurRad="57150" dist="19050" dir="5400000" algn="ctr" rotWithShape="0">
+              <a:srgbClr val="000000">
+                <a:alpha val="63000"/>
+              </a:srgbClr>
+            </a:outerShdw>
+          </a:effectLst>
+        </a:effectStyle>
+      </a:effectStyleLst>
+      <a:bgFillStyleLst>
+        <a:solidFill>
+          <a:schemeClr val="phClr"/>
+        </a:solidFill>
+        <a:solidFill>
+          <a:schemeClr val="phClr">
+            <a:tint val="95000"/>
+            <a:satMod val="170000"/>
+          </a:schemeClr>
+        </a:solidFill>
+        <a:gradFill rotWithShape="1">
+          <a:gsLst>
+            <a:gs pos="0">
+              <a:schemeClr val="phClr">
+                <a:tint val="93000"/>
+                <a:satMod val="150000"/>
+                <a:shade val="98000"/>
+                <a:lumMod val="102000"/>
+              </a:schemeClr>
+            </a:gs>
+            <a:gs pos="50000">
+              <a:schemeClr val="phClr">
+                <a:tint val="98000"/>
+                <a:satMod val="130000"/>
+                <a:shade val="90000"/>
+                <a:lumMod val="103000"/>
+              </a:schemeClr>
+            </a:gs>
+            <a:gs pos="100000">
+              <a:schemeClr val="phClr">
+                <a:shade val="63000"/>
+                <a:satMod val="120000"/>
+              </a:schemeClr>
+            </a:gs>
+          </a:gsLst>
+          <a:lin ang="5400000" scaled="0"/>
+        </a:gradFill>
+      </a:bgFillStyleLst>
+    </a:fmtScheme>
+  </a:themeElements>
+  <a:objectDefaults/>
+  <a:extraClrSchemeLst/>
+  <a:extLst>
+    <a:ext uri="{05A4C25C-085E-4340-85A3-A5531E510DB2}">
+      <thm15:themeFamily xmlns:thm15="http://schemas.microsoft.com/office/thememl/2012/main" name="Office Theme" id="{62F939B6-93AF-4DB8-9C6B-D6C7DFDC589F}" vid="{4A3C46E8-61CC-4603-A589-7422A47A8E4A}"/>
+    </a:ext>
+  </a:extLst>
+</a:theme>
+</file>
+
+<file path=ppt/theme/theme3.xml><?xml version="1.0" encoding="utf-8"?>
+<a:theme xmlns:a="http://schemas.openxmlformats.org/drawingml/2006/main" name="Office Theme">
+  <a:themeElements>
+    <a:clrScheme name="Office">
+      <a:dk1>
+        <a:sysClr val="windowText" lastClr="000000"/>
+      </a:dk1>
+      <a:lt1>
+        <a:sysClr val="window" lastClr="FFFFFF"/>
+      </a:lt1>
+      <a:dk2>
+        <a:srgbClr val="44546A"/>
+      </a:dk2>
+      <a:lt2>
+        <a:srgbClr val="E7E6E6"/>
+      </a:lt2>
+      <a:accent1>
+        <a:srgbClr val="5B9BD5"/>
+      </a:accent1>
+      <a:accent2>
+        <a:srgbClr val="ED7D31"/>
+      </a:accent2>
+      <a:accent3>
+        <a:srgbClr val="A5A5A5"/>
+      </a:accent3>
+      <a:accent4>
+        <a:srgbClr val="FFC000"/>
+      </a:accent4>
+      <a:accent5>
+        <a:srgbClr val="4472C4"/>
+      </a:accent5>
+      <a:accent6>
+        <a:srgbClr val="70AD47"/>
+      </a:accent6>
+      <a:hlink>
+        <a:srgbClr val="0563C1"/>
+      </a:hlink>
+      <a:folHlink>
+        <a:srgbClr val="954F72"/>
+      </a:folHlink>
+    </a:clrScheme>
+    <a:fontScheme name="Office">
+      <a:majorFont>
+        <a:latin typeface="Calibri Light" panose="020F0302020204030204"/>
+        <a:ea typeface=""/>
+        <a:cs typeface=""/>
+        <a:font script="Jpan" typeface="ＭＳ Ｐゴシック"/>
+        <a:font script="Hang" typeface="맑은 고딕"/>
+        <a:font script="Hans" typeface="宋体"/>
+        <a:font script="Hant" typeface="新細明體"/>
+        <a:font script="Arab" typeface="Times New Roman"/>
+        <a:font script="Hebr" typeface="Times New Roman"/>
+        <a:font script="Thai" typeface="Angsana New"/>
+        <a:font script="Ethi" typeface="Nyala"/>
+        <a:font script="Beng" typeface="Vrinda"/>
+        <a:font script="Gujr" typeface="Shruti"/>
+        <a:font script="Khmr" typeface="MoolBoran"/>
+        <a:font script="Knda" typeface="Tunga"/>
+        <a:font script="Guru" typeface="Raavi"/>
+        <a:font script="Cans" typeface="Euphemia"/>
+        <a:font script="Cher" typeface="Plantagenet Cherokee"/>
+        <a:font script="Yiii" typeface="Microsoft Yi Baiti"/>
+        <a:font script="Tibt" typeface="Microsoft Himalaya"/>
+        <a:font script="Thaa" typeface="MV Boli"/>
+        <a:font script="Deva" typeface="Mangal"/>
+        <a:font script="Telu" typeface="Gautami"/>
+        <a:font script="Taml" typeface="Latha"/>
+        <a:font script="Syrc" typeface="Estrangelo Edessa"/>
+        <a:font script="Orya" typeface="Kalinga"/>
+        <a:font script="Mlym" typeface="Kartika"/>
+        <a:font script="Laoo" typeface="DokChampa"/>
+        <a:font script="Sinh" typeface="Iskoola Pota"/>
+        <a:font script="Mong" typeface="Mongolian Baiti"/>
+        <a:font script="Viet" typeface="Times New Roman"/>
+        <a:font script="Uigh" typeface="Microsoft Uighur"/>
+        <a:font script="Geor" typeface="Sylfaen"/>
+      </a:majorFont>
+      <a:minorFont>
+        <a:latin typeface="Calibri" panose="020F0502020204030204"/>
+        <a:ea typeface=""/>
+        <a:cs typeface=""/>
+        <a:font script="Jpan" typeface="ＭＳ Ｐゴシック"/>
+        <a:font script="Hang" typeface="맑은 고딕"/>
+        <a:font script="Hans" typeface="宋体"/>
+        <a:font script="Hant" typeface="新細明體"/>
+        <a:font script="Arab" typeface="Arial"/>
+        <a:font script="Hebr" typeface="Arial"/>
+        <a:font script="Thai" typeface="Cordia New"/>
+        <a:font script="Ethi" typeface="Nyala"/>
+        <a:font script="Beng" typeface="Vrinda"/>
+        <a:font script="Gujr" typeface="Shruti"/>
+        <a:font script="Khmr" typeface="DaunPenh"/>
+        <a:font script="Knda" typeface="Tunga"/>
+        <a:font script="Guru" typeface="Raavi"/>
+        <a:font script="Cans" typeface="Euphemia"/>
+        <a:font script="Cher" typeface="Plantagenet Cherokee"/>
+        <a:font script="Yiii" typeface="Microsoft Yi Baiti"/>
+        <a:font script="Tibt" typeface="Microsoft Himalaya"/>
+        <a:font script="Thaa" typeface="MV Boli"/>
+        <a:font script="Deva" typeface="Mangal"/>
+        <a:font script="Telu" typeface="Gautami"/>
+        <a:font script="Taml" typeface="Latha"/>
+        <a:font script="Syrc" typeface="Estrangelo Edessa"/>
+        <a:font script="Orya" typeface="Kalinga"/>
+        <a:font script="Mlym" typeface="Kartika"/>
+        <a:font script="Laoo" typeface="DokChampa"/>
+        <a:font script="Sinh" typeface="Iskoola Pota"/>
+        <a:font script="Mong" typeface="Mongolian Baiti"/>
+        <a:font script="Viet" typeface="Arial"/>
+        <a:font script="Uigh" typeface="Microsoft Uighur"/>
+        <a:font script="Geor" typeface="Sylfaen"/>
+      </a:minorFont>
+    </a:fontScheme>
+    <a:fmtScheme name="Office">
+      <a:fillStyleLst>
+        <a:solidFill>
+          <a:schemeClr val="phClr"/>
+        </a:solidFill>
+        <a:gradFill rotWithShape="1">
+          <a:gsLst>
+            <a:gs pos="0">
+              <a:schemeClr val="phClr">
+                <a:lumMod val="110000"/>
+                <a:satMod val="105000"/>
+                <a:tint val="67000"/>
+              </a:schemeClr>
+            </a:gs>
+            <a:gs pos="50000">
+              <a:schemeClr val="phClr">
+                <a:lumMod val="105000"/>
+                <a:satMod val="103000"/>
+                <a:tint val="73000"/>
+              </a:schemeClr>
+            </a:gs>
+            <a:gs pos="100000">
+              <a:schemeClr val="phClr">
+                <a:lumMod val="105000"/>
+                <a:satMod val="109000"/>
+                <a:tint val="81000"/>
+              </a:schemeClr>
+            </a:gs>
+          </a:gsLst>
+          <a:lin ang="5400000" scaled="0"/>
+        </a:gradFill>
+        <a:gradFill rotWithShape="1">
+          <a:gsLst>
+            <a:gs pos="0">
+              <a:schemeClr val="phClr">
+                <a:satMod val="103000"/>
+                <a:lumMod val="102000"/>
+                <a:tint val="94000"/>
+              </a:schemeClr>
+            </a:gs>
+            <a:gs pos="50000">
+              <a:schemeClr val="phClr">
+                <a:satMod val="110000"/>
+                <a:lumMod val="100000"/>
+                <a:shade val="100000"/>
+              </a:schemeClr>
+            </a:gs>
+            <a:gs pos="100000">
+              <a:schemeClr val="phClr">
+                <a:lumMod val="99000"/>
+                <a:satMod val="120000"/>
+                <a:shade val="78000"/>
+              </a:schemeClr>
+            </a:gs>
+          </a:gsLst>
+          <a:lin ang="5400000" scaled="0"/>
+        </a:gradFill>
+      </a:fillStyleLst>
+      <a:lnStyleLst>
+        <a:ln w="6350" cap="flat" cmpd="sng" algn="ctr">
+          <a:solidFill>
+            <a:schemeClr val="phClr"/>
+          </a:solidFill>
+          <a:prstDash val="solid"/>
+          <a:miter lim="800000"/>
+        </a:ln>
+        <a:ln w="12700" cap="flat" cmpd="sng" algn="ctr">
+          <a:solidFill>
+            <a:schemeClr val="phClr"/>
+          </a:solidFill>
+          <a:prstDash val="solid"/>
+          <a:miter lim="800000"/>
+        </a:ln>
+        <a:ln w="19050" cap="flat" cmpd="sng" algn="ctr">
+          <a:solidFill>
+            <a:schemeClr val="phClr"/>
+          </a:solidFill>
+          <a:prstDash val="solid"/>
+          <a:miter lim="800000"/>
+        </a:ln>
+      </a:lnStyleLst>
+      <a:effectStyleLst>
+        <a:effectStyle>
+          <a:effectLst/>
+        </a:effectStyle>
+        <a:effectStyle>
+          <a:effectLst/>
+        </a:effectStyle>
+        <a:effectStyle>
+          <a:effectLst>
+            <a:outerShdw blurRad="57150" dist="19050" dir="5400000" algn="ctr" rotWithShape="0">
+              <a:srgbClr val="000000">
+                <a:alpha val="63000"/>
+              </a:srgbClr>
+            </a:outerShdw>
+          </a:effectLst>
+        </a:effectStyle>
+      </a:effectStyleLst>
+      <a:bgFillStyleLst>
+        <a:solidFill>
+          <a:schemeClr val="phClr"/>
+        </a:solidFill>
+        <a:solidFill>
+          <a:schemeClr val="phClr">
+            <a:tint val="95000"/>
+            <a:satMod val="170000"/>
+          </a:schemeClr>
+        </a:solidFill>
+        <a:gradFill rotWithShape="1">
+          <a:gsLst>
+            <a:gs pos="0">
+              <a:schemeClr val="phClr">
+                <a:tint val="93000"/>
+                <a:satMod val="150000"/>
+                <a:shade val="98000"/>
+                <a:lumMod val="102000"/>
+              </a:schemeClr>
+            </a:gs>
+            <a:gs pos="50000">
+              <a:schemeClr val="phClr">
+                <a:tint val="98000"/>
+                <a:satMod val="130000"/>
+                <a:shade val="90000"/>
+                <a:lumMod val="103000"/>
+              </a:schemeClr>
+            </a:gs>
+            <a:gs pos="100000">
+              <a:schemeClr val="phClr">
+                <a:shade val="63000"/>
+                <a:satMod val="120000"/>
+              </a:schemeClr>
+            </a:gs>
+          </a:gsLst>
+          <a:lin ang="5400000" scaled="0"/>
+        </a:gradFill>
+      </a:bgFillStyleLst>
+    </a:fmtScheme>
+  </a:themeElements>
+  <a:objectDefaults/>
+  <a:extraClrSchemeLst/>
+  <a:extLst>
+    <a:ext uri="{05A4C25C-085E-4340-85A3-A5531E510DB2}">
+      <thm15:themeFamily xmlns:thm15="http://schemas.microsoft.com/office/thememl/2012/main" name="Office Theme" id="{62F939B6-93AF-4DB8-9C6B-D6C7DFDC589F}" vid="{4A3C46E8-61CC-4603-A589-7422A47A8E4A}"/>
+    </a:ext>
+  </a:extLst>
+</a:theme>
 </file>
</xml_diff>